<commit_message>
Further edits - hyperlinks in project to each member's LinkedIn profile
</commit_message>
<xml_diff>
--- a/FinalPPMatt.pptx
+++ b/FinalPPMatt.pptx
@@ -165,7 +165,7 @@
   </p:defaultTextStyle>
   <p:extLst>
     <p:ext uri="{EFAFB233-063F-42B5-8137-9DF3F51BA10A}">
-      <p15:sldGuideLst xmlns:p15="http://schemas.microsoft.com/office/powerpoint/2012/main" xmlns="">
+      <p15:sldGuideLst xmlns:p15="http://schemas.microsoft.com/office/powerpoint/2012/main">
         <p15:guide id="1" orient="horz" pos="2160" userDrawn="1">
           <p15:clr>
             <a:srgbClr val="A4A3A4"/>
@@ -196,8 +196,151 @@
 <p1510:revInfo xmlns:a="http://schemas.openxmlformats.org/drawingml/2006/main" xmlns:r="http://schemas.openxmlformats.org/officeDocument/2006/relationships" xmlns:p1510="http://schemas.microsoft.com/office/powerpoint/2015/10/main">
   <p1510:revLst>
     <p1510:client id="{5D62A3CA-6CDA-46B9-9FD1-4A7099438FFA}" v="10" dt="2021-03-09T20:27:57.343"/>
+    <p1510:client id="{B2DEE9D0-05A2-4E8E-B561-106D6936E71B}" v="3" dt="2021-03-09T22:35:01.502"/>
   </p1510:revLst>
 </p1510:revInfo>
+</file>
+
+<file path=ppt/changesInfos/changesInfo1.xml><?xml version="1.0" encoding="utf-8"?>
+<pc:chgInfo xmlns:a="http://schemas.openxmlformats.org/drawingml/2006/main" xmlns:r="http://schemas.openxmlformats.org/officeDocument/2006/relationships" xmlns:ac="http://schemas.microsoft.com/office/drawing/2013/main/command" xmlns:pc="http://schemas.microsoft.com/office/powerpoint/2013/main/command">
+  <pc:docChgLst>
+    <pc:chgData name="Matt McMahon" userId="845ab47b2e71eca0" providerId="LiveId" clId="{B2DEE9D0-05A2-4E8E-B561-106D6936E71B}"/>
+    <pc:docChg chg="custSel modSld">
+      <pc:chgData name="Matt McMahon" userId="845ab47b2e71eca0" providerId="LiveId" clId="{B2DEE9D0-05A2-4E8E-B561-106D6936E71B}" dt="2021-03-09T22:36:24.035" v="160" actId="1076"/>
+      <pc:docMkLst>
+        <pc:docMk/>
+      </pc:docMkLst>
+      <pc:sldChg chg="modSp mod">
+        <pc:chgData name="Matt McMahon" userId="845ab47b2e71eca0" providerId="LiveId" clId="{B2DEE9D0-05A2-4E8E-B561-106D6936E71B}" dt="2021-03-09T22:36:24.035" v="160" actId="1076"/>
+        <pc:sldMkLst>
+          <pc:docMk/>
+          <pc:sldMk cId="0" sldId="1873"/>
+        </pc:sldMkLst>
+        <pc:spChg chg="mod">
+          <ac:chgData name="Matt McMahon" userId="845ab47b2e71eca0" providerId="LiveId" clId="{B2DEE9D0-05A2-4E8E-B561-106D6936E71B}" dt="2021-03-09T22:36:24.035" v="160" actId="1076"/>
+          <ac:spMkLst>
+            <pc:docMk/>
+            <pc:sldMk cId="0" sldId="1873"/>
+            <ac:spMk id="3" creationId="{00000000-0000-0000-0000-000000000000}"/>
+          </ac:spMkLst>
+        </pc:spChg>
+        <pc:spChg chg="mod">
+          <ac:chgData name="Matt McMahon" userId="845ab47b2e71eca0" providerId="LiveId" clId="{B2DEE9D0-05A2-4E8E-B561-106D6936E71B}" dt="2021-03-09T22:36:16.849" v="159" actId="1076"/>
+          <ac:spMkLst>
+            <pc:docMk/>
+            <pc:sldMk cId="0" sldId="1873"/>
+            <ac:spMk id="5" creationId="{048FBE6B-DC67-4E64-80F4-CADE978D2FE3}"/>
+          </ac:spMkLst>
+        </pc:spChg>
+      </pc:sldChg>
+      <pc:sldChg chg="modSp mod">
+        <pc:chgData name="Matt McMahon" userId="845ab47b2e71eca0" providerId="LiveId" clId="{B2DEE9D0-05A2-4E8E-B561-106D6936E71B}" dt="2021-03-09T22:28:12.736" v="114" actId="20577"/>
+        <pc:sldMkLst>
+          <pc:docMk/>
+          <pc:sldMk cId="0" sldId="1881"/>
+        </pc:sldMkLst>
+        <pc:spChg chg="mod">
+          <ac:chgData name="Matt McMahon" userId="845ab47b2e71eca0" providerId="LiveId" clId="{B2DEE9D0-05A2-4E8E-B561-106D6936E71B}" dt="2021-03-09T22:28:12.736" v="114" actId="20577"/>
+          <ac:spMkLst>
+            <pc:docMk/>
+            <pc:sldMk cId="0" sldId="1881"/>
+            <ac:spMk id="2" creationId="{00000000-0000-0000-0000-000000000000}"/>
+          </ac:spMkLst>
+        </pc:spChg>
+      </pc:sldChg>
+      <pc:sldChg chg="modSp mod">
+        <pc:chgData name="Matt McMahon" userId="845ab47b2e71eca0" providerId="LiveId" clId="{B2DEE9D0-05A2-4E8E-B561-106D6936E71B}" dt="2021-03-09T22:29:01.520" v="117" actId="20577"/>
+        <pc:sldMkLst>
+          <pc:docMk/>
+          <pc:sldMk cId="0" sldId="1890"/>
+        </pc:sldMkLst>
+        <pc:spChg chg="mod">
+          <ac:chgData name="Matt McMahon" userId="845ab47b2e71eca0" providerId="LiveId" clId="{B2DEE9D0-05A2-4E8E-B561-106D6936E71B}" dt="2021-03-09T22:29:01.520" v="117" actId="20577"/>
+          <ac:spMkLst>
+            <pc:docMk/>
+            <pc:sldMk cId="0" sldId="1890"/>
+            <ac:spMk id="3" creationId="{00000000-0000-0000-0000-000000000000}"/>
+          </ac:spMkLst>
+        </pc:spChg>
+      </pc:sldChg>
+      <pc:sldChg chg="modSp mod">
+        <pc:chgData name="Matt McMahon" userId="845ab47b2e71eca0" providerId="LiveId" clId="{B2DEE9D0-05A2-4E8E-B561-106D6936E71B}" dt="2021-03-09T22:27:36.832" v="93" actId="20577"/>
+        <pc:sldMkLst>
+          <pc:docMk/>
+          <pc:sldMk cId="0" sldId="1906"/>
+        </pc:sldMkLst>
+        <pc:spChg chg="mod">
+          <ac:chgData name="Matt McMahon" userId="845ab47b2e71eca0" providerId="LiveId" clId="{B2DEE9D0-05A2-4E8E-B561-106D6936E71B}" dt="2021-03-09T22:27:36.832" v="93" actId="20577"/>
+          <ac:spMkLst>
+            <pc:docMk/>
+            <pc:sldMk cId="0" sldId="1906"/>
+            <ac:spMk id="2" creationId="{00000000-0000-0000-0000-000000000000}"/>
+          </ac:spMkLst>
+        </pc:spChg>
+      </pc:sldChg>
+      <pc:sldChg chg="modSp mod">
+        <pc:chgData name="Matt McMahon" userId="845ab47b2e71eca0" providerId="LiveId" clId="{B2DEE9D0-05A2-4E8E-B561-106D6936E71B}" dt="2021-03-09T22:27:00.179" v="90" actId="20577"/>
+        <pc:sldMkLst>
+          <pc:docMk/>
+          <pc:sldMk cId="0" sldId="1907"/>
+        </pc:sldMkLst>
+        <pc:spChg chg="mod">
+          <ac:chgData name="Matt McMahon" userId="845ab47b2e71eca0" providerId="LiveId" clId="{B2DEE9D0-05A2-4E8E-B561-106D6936E71B}" dt="2021-03-09T22:27:00.179" v="90" actId="20577"/>
+          <ac:spMkLst>
+            <pc:docMk/>
+            <pc:sldMk cId="0" sldId="1907"/>
+            <ac:spMk id="7" creationId="{00000000-0000-0000-0000-000000000000}"/>
+          </ac:spMkLst>
+        </pc:spChg>
+      </pc:sldChg>
+      <pc:sldChg chg="modSp mod">
+        <pc:chgData name="Matt McMahon" userId="845ab47b2e71eca0" providerId="LiveId" clId="{B2DEE9D0-05A2-4E8E-B561-106D6936E71B}" dt="2021-03-09T22:24:54.361" v="64" actId="20577"/>
+        <pc:sldMkLst>
+          <pc:docMk/>
+          <pc:sldMk cId="0" sldId="1910"/>
+        </pc:sldMkLst>
+        <pc:spChg chg="mod">
+          <ac:chgData name="Matt McMahon" userId="845ab47b2e71eca0" providerId="LiveId" clId="{B2DEE9D0-05A2-4E8E-B561-106D6936E71B}" dt="2021-03-09T22:24:54.361" v="64" actId="20577"/>
+          <ac:spMkLst>
+            <pc:docMk/>
+            <pc:sldMk cId="0" sldId="1910"/>
+            <ac:spMk id="7" creationId="{00000000-0000-0000-0000-000000000000}"/>
+          </ac:spMkLst>
+        </pc:spChg>
+      </pc:sldChg>
+      <pc:sldChg chg="modSp mod">
+        <pc:chgData name="Matt McMahon" userId="845ab47b2e71eca0" providerId="LiveId" clId="{B2DEE9D0-05A2-4E8E-B561-106D6936E71B}" dt="2021-03-09T22:32:20.777" v="158" actId="114"/>
+        <pc:sldMkLst>
+          <pc:docMk/>
+          <pc:sldMk cId="2493105783" sldId="1914"/>
+        </pc:sldMkLst>
+        <pc:spChg chg="mod">
+          <ac:chgData name="Matt McMahon" userId="845ab47b2e71eca0" providerId="LiveId" clId="{B2DEE9D0-05A2-4E8E-B561-106D6936E71B}" dt="2021-03-09T22:32:20.777" v="158" actId="114"/>
+          <ac:spMkLst>
+            <pc:docMk/>
+            <pc:sldMk cId="2493105783" sldId="1914"/>
+            <ac:spMk id="2" creationId="{3F36812B-2065-4A2B-B59B-8957022687BC}"/>
+          </ac:spMkLst>
+        </pc:spChg>
+      </pc:sldChg>
+      <pc:sldChg chg="modSp mod">
+        <pc:chgData name="Matt McMahon" userId="845ab47b2e71eca0" providerId="LiveId" clId="{B2DEE9D0-05A2-4E8E-B561-106D6936E71B}" dt="2021-03-09T22:30:40.652" v="144" actId="20577"/>
+        <pc:sldMkLst>
+          <pc:docMk/>
+          <pc:sldMk cId="0" sldId="1915"/>
+        </pc:sldMkLst>
+        <pc:spChg chg="mod">
+          <ac:chgData name="Matt McMahon" userId="845ab47b2e71eca0" providerId="LiveId" clId="{B2DEE9D0-05A2-4E8E-B561-106D6936E71B}" dt="2021-03-09T22:30:40.652" v="144" actId="20577"/>
+          <ac:spMkLst>
+            <pc:docMk/>
+            <pc:sldMk cId="0" sldId="1915"/>
+            <ac:spMk id="3" creationId="{00000000-0000-0000-0000-000000000000}"/>
+          </ac:spMkLst>
+        </pc:spChg>
+      </pc:sldChg>
+    </pc:docChg>
+  </pc:docChgLst>
+</pc:chgInfo>
 </file>
 
 <file path=ppt/notesMasters/notesMaster1.xml><?xml version="1.0" encoding="utf-8"?>
@@ -230,7 +373,7 @@
           <p:cNvPr id="30722" name="Rectangle 2">
             <a:extLst>
               <a:ext uri="{FF2B5EF4-FFF2-40B4-BE49-F238E27FC236}">
-                <a16:creationId xmlns:a16="http://schemas.microsoft.com/office/drawing/2014/main" xmlns="" id="{D9F622F8-1824-4338-8C3C-5529D3BDEF4A}"/>
+                <a16:creationId xmlns:a16="http://schemas.microsoft.com/office/drawing/2014/main" id="{D9F622F8-1824-4338-8C3C-5529D3BDEF4A}"/>
               </a:ext>
             </a:extLst>
           </p:cNvPr>
@@ -284,7 +427,7 @@
           <p:cNvPr id="30723" name="Rectangle 3">
             <a:extLst>
               <a:ext uri="{FF2B5EF4-FFF2-40B4-BE49-F238E27FC236}">
-                <a16:creationId xmlns:a16="http://schemas.microsoft.com/office/drawing/2014/main" xmlns="" id="{618DDD53-BB38-4118-BC75-9CE27D49C550}"/>
+                <a16:creationId xmlns:a16="http://schemas.microsoft.com/office/drawing/2014/main" id="{618DDD53-BB38-4118-BC75-9CE27D49C550}"/>
               </a:ext>
             </a:extLst>
           </p:cNvPr>
@@ -338,7 +481,7 @@
           <p:cNvPr id="14340" name="Rectangle 4">
             <a:extLst>
               <a:ext uri="{FF2B5EF4-FFF2-40B4-BE49-F238E27FC236}">
-                <a16:creationId xmlns:a16="http://schemas.microsoft.com/office/drawing/2014/main" xmlns="" id="{6C03B6F7-B1AE-4118-ABA2-FFEC9B8F0E9C}"/>
+                <a16:creationId xmlns:a16="http://schemas.microsoft.com/office/drawing/2014/main" id="{6C03B6F7-B1AE-4118-ABA2-FFEC9B8F0E9C}"/>
               </a:ext>
             </a:extLst>
           </p:cNvPr>
@@ -368,7 +511,7 @@
           </a:ln>
           <a:extLst>
             <a:ext uri="{909E8E84-426E-40DD-AFC4-6F175D3DCCD1}">
-              <a14:hiddenFill xmlns:a14="http://schemas.microsoft.com/office/drawing/2010/main" xmlns="">
+              <a14:hiddenFill xmlns:a14="http://schemas.microsoft.com/office/drawing/2010/main">
                 <a:solidFill>
                   <a:srgbClr val="FFFFFF"/>
                 </a:solidFill>
@@ -382,7 +525,7 @@
           <p:cNvPr id="30725" name="Rectangle 5">
             <a:extLst>
               <a:ext uri="{FF2B5EF4-FFF2-40B4-BE49-F238E27FC236}">
-                <a16:creationId xmlns:a16="http://schemas.microsoft.com/office/drawing/2014/main" xmlns="" id="{646F5356-BDE8-43C1-9587-85323D02B191}"/>
+                <a16:creationId xmlns:a16="http://schemas.microsoft.com/office/drawing/2014/main" id="{646F5356-BDE8-43C1-9587-85323D02B191}"/>
               </a:ext>
             </a:extLst>
           </p:cNvPr>
@@ -459,7 +602,7 @@
           <p:cNvPr id="30726" name="Rectangle 6">
             <a:extLst>
               <a:ext uri="{FF2B5EF4-FFF2-40B4-BE49-F238E27FC236}">
-                <a16:creationId xmlns:a16="http://schemas.microsoft.com/office/drawing/2014/main" xmlns="" id="{89912C35-11A9-4DA7-8476-F1823F658CAA}"/>
+                <a16:creationId xmlns:a16="http://schemas.microsoft.com/office/drawing/2014/main" id="{89912C35-11A9-4DA7-8476-F1823F658CAA}"/>
               </a:ext>
             </a:extLst>
           </p:cNvPr>
@@ -513,7 +656,7 @@
           <p:cNvPr id="30727" name="Rectangle 7">
             <a:extLst>
               <a:ext uri="{FF2B5EF4-FFF2-40B4-BE49-F238E27FC236}">
-                <a16:creationId xmlns:a16="http://schemas.microsoft.com/office/drawing/2014/main" xmlns="" id="{7180ED79-CEC3-4FB9-B511-8597B20A0C10}"/>
+                <a16:creationId xmlns:a16="http://schemas.microsoft.com/office/drawing/2014/main" id="{7180ED79-CEC3-4FB9-B511-8597B20A0C10}"/>
               </a:ext>
             </a:extLst>
           </p:cNvPr>
@@ -610,7 +753,7 @@
           <p:cNvPr id="15362" name="Rectangle 7">
             <a:extLst>
               <a:ext uri="{FF2B5EF4-FFF2-40B4-BE49-F238E27FC236}">
-                <a16:creationId xmlns:a16="http://schemas.microsoft.com/office/drawing/2014/main" xmlns="" id="{FA4671F7-4D2C-4B1E-AED7-24676BE8B496}"/>
+                <a16:creationId xmlns:a16="http://schemas.microsoft.com/office/drawing/2014/main" id="{FA4671F7-4D2C-4B1E-AED7-24676BE8B496}"/>
               </a:ext>
             </a:extLst>
           </p:cNvPr>
@@ -626,14 +769,14 @@
           <a:ln/>
           <a:extLst>
             <a:ext uri="{909E8E84-426E-40DD-AFC4-6F175D3DCCD1}">
-              <a14:hiddenFill xmlns:a14="http://schemas.microsoft.com/office/drawing/2010/main" xmlns="">
+              <a14:hiddenFill xmlns:a14="http://schemas.microsoft.com/office/drawing/2010/main">
                 <a:solidFill>
                   <a:srgbClr val="FFFFFF"/>
                 </a:solidFill>
               </a14:hiddenFill>
             </a:ext>
             <a:ext uri="{91240B29-F687-4F45-9708-019B960494DF}">
-              <a14:hiddenLine xmlns:a14="http://schemas.microsoft.com/office/drawing/2010/main" xmlns="" w="9525">
+              <a14:hiddenLine xmlns:a14="http://schemas.microsoft.com/office/drawing/2010/main" w="9525">
                 <a:solidFill>
                   <a:srgbClr val="000000"/>
                 </a:solidFill>
@@ -764,7 +907,7 @@
           <p:cNvPr id="15363" name="Rectangle 2">
             <a:extLst>
               <a:ext uri="{FF2B5EF4-FFF2-40B4-BE49-F238E27FC236}">
-                <a16:creationId xmlns:a16="http://schemas.microsoft.com/office/drawing/2014/main" xmlns="" id="{D8E83BD0-7AE4-4323-9047-FC368929C520}"/>
+                <a16:creationId xmlns:a16="http://schemas.microsoft.com/office/drawing/2014/main" id="{D8E83BD0-7AE4-4323-9047-FC368929C520}"/>
               </a:ext>
             </a:extLst>
           </p:cNvPr>
@@ -784,7 +927,7 @@
           <p:cNvPr id="15364" name="Rectangle 3">
             <a:extLst>
               <a:ext uri="{FF2B5EF4-FFF2-40B4-BE49-F238E27FC236}">
-                <a16:creationId xmlns:a16="http://schemas.microsoft.com/office/drawing/2014/main" xmlns="" id="{FDECF5EC-C5EC-4723-8F4F-A75A20018F65}"/>
+                <a16:creationId xmlns:a16="http://schemas.microsoft.com/office/drawing/2014/main" id="{FDECF5EC-C5EC-4723-8F4F-A75A20018F65}"/>
               </a:ext>
             </a:extLst>
           </p:cNvPr>
@@ -800,14 +943,14 @@
           <a:ln/>
           <a:extLst>
             <a:ext uri="{909E8E84-426E-40DD-AFC4-6F175D3DCCD1}">
-              <a14:hiddenFill xmlns:a14="http://schemas.microsoft.com/office/drawing/2010/main" xmlns="">
+              <a14:hiddenFill xmlns:a14="http://schemas.microsoft.com/office/drawing/2010/main">
                 <a:solidFill>
                   <a:srgbClr val="FFFFFF"/>
                 </a:solidFill>
               </a14:hiddenFill>
             </a:ext>
             <a:ext uri="{91240B29-F687-4F45-9708-019B960494DF}">
-              <a14:hiddenLine xmlns:a14="http://schemas.microsoft.com/office/drawing/2010/main" xmlns="" w="9525">
+              <a14:hiddenLine xmlns:a14="http://schemas.microsoft.com/office/drawing/2010/main" w="9525">
                 <a:solidFill>
                   <a:srgbClr val="000000"/>
                 </a:solidFill>
@@ -830,7 +973,7 @@
     </p:spTree>
     <p:extLst>
       <p:ext uri="{BB962C8B-B14F-4D97-AF65-F5344CB8AC3E}">
-        <p14:creationId xmlns:p14="http://schemas.microsoft.com/office/powerpoint/2010/main" xmlns="" val="1950814835"/>
+        <p14:creationId xmlns:p14="http://schemas.microsoft.com/office/powerpoint/2010/main" val="1950814835"/>
       </p:ext>
     </p:extLst>
   </p:cSld>
@@ -860,7 +1003,7 @@
     </p:spTree>
     <p:extLst>
       <p:ext uri="{BB962C8B-B14F-4D97-AF65-F5344CB8AC3E}">
-        <p14:creationId xmlns:p14="http://schemas.microsoft.com/office/powerpoint/2010/main" xmlns="" val="2719101752"/>
+        <p14:creationId xmlns:p14="http://schemas.microsoft.com/office/powerpoint/2010/main" val="2719101752"/>
       </p:ext>
     </p:extLst>
   </p:cSld>
@@ -945,7 +1088,7 @@
     </p:spTree>
     <p:extLst>
       <p:ext uri="{BB962C8B-B14F-4D97-AF65-F5344CB8AC3E}">
-        <p14:creationId xmlns:p14="http://schemas.microsoft.com/office/powerpoint/2010/main" xmlns="" val="1632278876"/>
+        <p14:creationId xmlns:p14="http://schemas.microsoft.com/office/powerpoint/2010/main" val="1632278876"/>
       </p:ext>
     </p:extLst>
   </p:cSld>
@@ -1030,7 +1173,7 @@
     </p:spTree>
     <p:extLst>
       <p:ext uri="{BB962C8B-B14F-4D97-AF65-F5344CB8AC3E}">
-        <p14:creationId xmlns:p14="http://schemas.microsoft.com/office/powerpoint/2010/main" xmlns="" val="1632278876"/>
+        <p14:creationId xmlns:p14="http://schemas.microsoft.com/office/powerpoint/2010/main" val="1632278876"/>
       </p:ext>
     </p:extLst>
   </p:cSld>
@@ -1115,7 +1258,7 @@
     </p:spTree>
     <p:extLst>
       <p:ext uri="{BB962C8B-B14F-4D97-AF65-F5344CB8AC3E}">
-        <p14:creationId xmlns:p14="http://schemas.microsoft.com/office/powerpoint/2010/main" xmlns="" val="1632278876"/>
+        <p14:creationId xmlns:p14="http://schemas.microsoft.com/office/powerpoint/2010/main" val="1632278876"/>
       </p:ext>
     </p:extLst>
   </p:cSld>
@@ -1155,7 +1298,7 @@
           <p:cNvPr id="2" name="Picture 1" descr="Chart, background pattern&#10;&#10;Description automatically generated">
             <a:extLst>
               <a:ext uri="{FF2B5EF4-FFF2-40B4-BE49-F238E27FC236}">
-                <a16:creationId xmlns:a16="http://schemas.microsoft.com/office/drawing/2014/main" xmlns="" id="{F3386FAC-ADFA-41EF-9C49-66952E35CA9C}"/>
+                <a16:creationId xmlns:a16="http://schemas.microsoft.com/office/drawing/2014/main" id="{F3386FAC-ADFA-41EF-9C49-66952E35CA9C}"/>
               </a:ext>
             </a:extLst>
           </p:cNvPr>
@@ -1168,7 +1311,7 @@
           <a:blip r:embed="rId2">
             <a:extLst>
               <a:ext uri="{28A0092B-C50C-407E-A947-70E740481C1C}">
-                <a14:useLocalDpi xmlns:a14="http://schemas.microsoft.com/office/drawing/2010/main" xmlns="" val="0"/>
+                <a14:useLocalDpi xmlns:a14="http://schemas.microsoft.com/office/drawing/2010/main" val="0"/>
               </a:ext>
             </a:extLst>
           </a:blip>
@@ -1190,7 +1333,7 @@
           <p:cNvPr id="19" name="Text Placeholder 18">
             <a:extLst>
               <a:ext uri="{FF2B5EF4-FFF2-40B4-BE49-F238E27FC236}">
-                <a16:creationId xmlns:a16="http://schemas.microsoft.com/office/drawing/2014/main" xmlns="" id="{69BE3FD0-1382-4F0E-A01F-F6C205E7DCDC}"/>
+                <a16:creationId xmlns:a16="http://schemas.microsoft.com/office/drawing/2014/main" id="{69BE3FD0-1382-4F0E-A01F-F6C205E7DCDC}"/>
               </a:ext>
             </a:extLst>
           </p:cNvPr>
@@ -1249,7 +1392,7 @@
           <p:cNvPr id="7" name="Rectangle 2">
             <a:extLst>
               <a:ext uri="{FF2B5EF4-FFF2-40B4-BE49-F238E27FC236}">
-                <a16:creationId xmlns:a16="http://schemas.microsoft.com/office/drawing/2014/main" xmlns="" id="{2E0BC0C9-E1C8-43B4-B02D-558783360CD4}"/>
+                <a16:creationId xmlns:a16="http://schemas.microsoft.com/office/drawing/2014/main" id="{2E0BC0C9-E1C8-43B4-B02D-558783360CD4}"/>
               </a:ext>
             </a:extLst>
           </p:cNvPr>
@@ -1294,7 +1437,7 @@
     </p:spTree>
     <p:extLst>
       <p:ext uri="{BB962C8B-B14F-4D97-AF65-F5344CB8AC3E}">
-        <p14:creationId xmlns:p14="http://schemas.microsoft.com/office/powerpoint/2010/main" xmlns="" val="1440679267"/>
+        <p14:creationId xmlns:p14="http://schemas.microsoft.com/office/powerpoint/2010/main" val="1440679267"/>
       </p:ext>
     </p:extLst>
   </p:cSld>
@@ -1303,7 +1446,7 @@
   </p:clrMapOvr>
   <p:extLst>
     <p:ext uri="{DCECCB84-F9BA-43D5-87BE-67443E8EF086}">
-      <p15:sldGuideLst xmlns:p15="http://schemas.microsoft.com/office/powerpoint/2012/main" xmlns="">
+      <p15:sldGuideLst xmlns:p15="http://schemas.microsoft.com/office/powerpoint/2012/main">
         <p15:guide id="1" pos="2808" userDrawn="1">
           <p15:clr>
             <a:srgbClr val="FBAE40"/>
@@ -1410,7 +1553,7 @@
     </p:spTree>
     <p:extLst>
       <p:ext uri="{BB962C8B-B14F-4D97-AF65-F5344CB8AC3E}">
-        <p14:creationId xmlns:p14="http://schemas.microsoft.com/office/powerpoint/2010/main" xmlns="" val="4137841689"/>
+        <p14:creationId xmlns:p14="http://schemas.microsoft.com/office/powerpoint/2010/main" val="4137841689"/>
       </p:ext>
     </p:extLst>
   </p:cSld>
@@ -1450,7 +1593,7 @@
           <p:cNvPr id="3" name="Picture 2" descr="Chart, background pattern&#10;&#10;Description automatically generated">
             <a:extLst>
               <a:ext uri="{FF2B5EF4-FFF2-40B4-BE49-F238E27FC236}">
-                <a16:creationId xmlns:a16="http://schemas.microsoft.com/office/drawing/2014/main" xmlns="" id="{E9914566-E790-44E9-BF0F-0D38A423F962}"/>
+                <a16:creationId xmlns:a16="http://schemas.microsoft.com/office/drawing/2014/main" id="{E9914566-E790-44E9-BF0F-0D38A423F962}"/>
               </a:ext>
             </a:extLst>
           </p:cNvPr>
@@ -1463,7 +1606,7 @@
           <a:blip r:embed="rId2">
             <a:extLst>
               <a:ext uri="{28A0092B-C50C-407E-A947-70E740481C1C}">
-                <a14:useLocalDpi xmlns:a14="http://schemas.microsoft.com/office/drawing/2010/main" xmlns="" val="0"/>
+                <a14:useLocalDpi xmlns:a14="http://schemas.microsoft.com/office/drawing/2010/main" val="0"/>
               </a:ext>
             </a:extLst>
           </a:blip>
@@ -1485,7 +1628,7 @@
           <p:cNvPr id="16" name="Text Placeholder 15">
             <a:extLst>
               <a:ext uri="{FF2B5EF4-FFF2-40B4-BE49-F238E27FC236}">
-                <a16:creationId xmlns:a16="http://schemas.microsoft.com/office/drawing/2014/main" xmlns="" id="{8498B63D-F60C-4A9D-8D3E-0C7CD748FEDE}"/>
+                <a16:creationId xmlns:a16="http://schemas.microsoft.com/office/drawing/2014/main" id="{8498B63D-F60C-4A9D-8D3E-0C7CD748FEDE}"/>
               </a:ext>
             </a:extLst>
           </p:cNvPr>
@@ -1534,7 +1677,7 @@
           <p:cNvPr id="14" name="Picture Placeholder 13">
             <a:extLst>
               <a:ext uri="{FF2B5EF4-FFF2-40B4-BE49-F238E27FC236}">
-                <a16:creationId xmlns:a16="http://schemas.microsoft.com/office/drawing/2014/main" xmlns="" id="{9B1932CF-F265-4AEE-8704-F42C01AFB479}"/>
+                <a16:creationId xmlns:a16="http://schemas.microsoft.com/office/drawing/2014/main" id="{9B1932CF-F265-4AEE-8704-F42C01AFB479}"/>
               </a:ext>
             </a:extLst>
           </p:cNvPr>
@@ -1573,7 +1716,7 @@
           <p:cNvPr id="2" name="Title 1">
             <a:extLst>
               <a:ext uri="{FF2B5EF4-FFF2-40B4-BE49-F238E27FC236}">
-                <a16:creationId xmlns:a16="http://schemas.microsoft.com/office/drawing/2014/main" xmlns="" id="{891853E6-9C06-4DC2-B8A4-681C3D34BE75}"/>
+                <a16:creationId xmlns:a16="http://schemas.microsoft.com/office/drawing/2014/main" id="{891853E6-9C06-4DC2-B8A4-681C3D34BE75}"/>
               </a:ext>
             </a:extLst>
           </p:cNvPr>
@@ -1619,7 +1762,7 @@
     </p:spTree>
     <p:extLst>
       <p:ext uri="{BB962C8B-B14F-4D97-AF65-F5344CB8AC3E}">
-        <p14:creationId xmlns:p14="http://schemas.microsoft.com/office/powerpoint/2010/main" xmlns="" val="3104946878"/>
+        <p14:creationId xmlns:p14="http://schemas.microsoft.com/office/powerpoint/2010/main" val="3104946878"/>
       </p:ext>
     </p:extLst>
   </p:cSld>
@@ -1659,7 +1802,7 @@
           <p:cNvPr id="3" name="Picture 2" descr="Chart, background pattern&#10;&#10;Description automatically generated">
             <a:extLst>
               <a:ext uri="{FF2B5EF4-FFF2-40B4-BE49-F238E27FC236}">
-                <a16:creationId xmlns:a16="http://schemas.microsoft.com/office/drawing/2014/main" xmlns="" id="{B4F28166-FA93-42F3-90D5-A5BBE10D86FE}"/>
+                <a16:creationId xmlns:a16="http://schemas.microsoft.com/office/drawing/2014/main" id="{B4F28166-FA93-42F3-90D5-A5BBE10D86FE}"/>
               </a:ext>
             </a:extLst>
           </p:cNvPr>
@@ -1672,7 +1815,7 @@
           <a:blip r:embed="rId2">
             <a:extLst>
               <a:ext uri="{28A0092B-C50C-407E-A947-70E740481C1C}">
-                <a14:useLocalDpi xmlns:a14="http://schemas.microsoft.com/office/drawing/2010/main" xmlns="" val="0"/>
+                <a14:useLocalDpi xmlns:a14="http://schemas.microsoft.com/office/drawing/2010/main" val="0"/>
               </a:ext>
             </a:extLst>
           </a:blip>
@@ -1694,7 +1837,7 @@
           <p:cNvPr id="16" name="Text Placeholder 15">
             <a:extLst>
               <a:ext uri="{FF2B5EF4-FFF2-40B4-BE49-F238E27FC236}">
-                <a16:creationId xmlns:a16="http://schemas.microsoft.com/office/drawing/2014/main" xmlns="" id="{8498B63D-F60C-4A9D-8D3E-0C7CD748FEDE}"/>
+                <a16:creationId xmlns:a16="http://schemas.microsoft.com/office/drawing/2014/main" id="{8498B63D-F60C-4A9D-8D3E-0C7CD748FEDE}"/>
               </a:ext>
             </a:extLst>
           </p:cNvPr>
@@ -1743,7 +1886,7 @@
           <p:cNvPr id="8" name="Picture Placeholder 13">
             <a:extLst>
               <a:ext uri="{FF2B5EF4-FFF2-40B4-BE49-F238E27FC236}">
-                <a16:creationId xmlns:a16="http://schemas.microsoft.com/office/drawing/2014/main" xmlns="" id="{89E410BA-B0FE-4F0E-8BE5-D33CC016635B}"/>
+                <a16:creationId xmlns:a16="http://schemas.microsoft.com/office/drawing/2014/main" id="{89E410BA-B0FE-4F0E-8BE5-D33CC016635B}"/>
               </a:ext>
             </a:extLst>
           </p:cNvPr>
@@ -1784,7 +1927,7 @@
           <p:cNvPr id="9" name="Picture Placeholder 13">
             <a:extLst>
               <a:ext uri="{FF2B5EF4-FFF2-40B4-BE49-F238E27FC236}">
-                <a16:creationId xmlns:a16="http://schemas.microsoft.com/office/drawing/2014/main" xmlns="" id="{827A95C0-AE8D-46E1-9EF9-64504CBEF99E}"/>
+                <a16:creationId xmlns:a16="http://schemas.microsoft.com/office/drawing/2014/main" id="{827A95C0-AE8D-46E1-9EF9-64504CBEF99E}"/>
               </a:ext>
             </a:extLst>
           </p:cNvPr>
@@ -1825,7 +1968,7 @@
           <p:cNvPr id="7" name="Title 1">
             <a:extLst>
               <a:ext uri="{FF2B5EF4-FFF2-40B4-BE49-F238E27FC236}">
-                <a16:creationId xmlns:a16="http://schemas.microsoft.com/office/drawing/2014/main" xmlns="" id="{9AF0AFCE-F48A-4C35-9245-AFC319274E50}"/>
+                <a16:creationId xmlns:a16="http://schemas.microsoft.com/office/drawing/2014/main" id="{9AF0AFCE-F48A-4C35-9245-AFC319274E50}"/>
               </a:ext>
             </a:extLst>
           </p:cNvPr>
@@ -1871,7 +2014,7 @@
     </p:spTree>
     <p:extLst>
       <p:ext uri="{BB962C8B-B14F-4D97-AF65-F5344CB8AC3E}">
-        <p14:creationId xmlns:p14="http://schemas.microsoft.com/office/powerpoint/2010/main" xmlns="" val="1586680172"/>
+        <p14:creationId xmlns:p14="http://schemas.microsoft.com/office/powerpoint/2010/main" val="1586680172"/>
       </p:ext>
     </p:extLst>
   </p:cSld>
@@ -1880,7 +2023,7 @@
   </p:clrMapOvr>
   <p:extLst>
     <p:ext uri="{DCECCB84-F9BA-43D5-87BE-67443E8EF086}">
-      <p15:sldGuideLst xmlns:p15="http://schemas.microsoft.com/office/powerpoint/2012/main" xmlns="">
+      <p15:sldGuideLst xmlns:p15="http://schemas.microsoft.com/office/powerpoint/2012/main">
         <p15:guide id="1" orient="horz" pos="3672" userDrawn="1">
           <p15:clr>
             <a:srgbClr val="FBAE40"/>
@@ -1924,7 +2067,7 @@
           <p:cNvPr id="2" name="Picture 1" descr="Chart, background pattern&#10;&#10;Description automatically generated">
             <a:extLst>
               <a:ext uri="{FF2B5EF4-FFF2-40B4-BE49-F238E27FC236}">
-                <a16:creationId xmlns:a16="http://schemas.microsoft.com/office/drawing/2014/main" xmlns="" id="{570FCE13-E0EE-4C5A-BDB0-04E8FE4D216E}"/>
+                <a16:creationId xmlns:a16="http://schemas.microsoft.com/office/drawing/2014/main" id="{570FCE13-E0EE-4C5A-BDB0-04E8FE4D216E}"/>
               </a:ext>
             </a:extLst>
           </p:cNvPr>
@@ -1937,7 +2080,7 @@
           <a:blip r:embed="rId2">
             <a:extLst>
               <a:ext uri="{28A0092B-C50C-407E-A947-70E740481C1C}">
-                <a14:useLocalDpi xmlns:a14="http://schemas.microsoft.com/office/drawing/2010/main" xmlns="" val="0"/>
+                <a14:useLocalDpi xmlns:a14="http://schemas.microsoft.com/office/drawing/2010/main" val="0"/>
               </a:ext>
             </a:extLst>
           </a:blip>
@@ -1959,7 +2102,7 @@
           <p:cNvPr id="12" name="Text Placeholder 15">
             <a:extLst>
               <a:ext uri="{FF2B5EF4-FFF2-40B4-BE49-F238E27FC236}">
-                <a16:creationId xmlns:a16="http://schemas.microsoft.com/office/drawing/2014/main" xmlns="" id="{E8DBED36-2461-46D0-AF71-79E0064B3758}"/>
+                <a16:creationId xmlns:a16="http://schemas.microsoft.com/office/drawing/2014/main" id="{E8DBED36-2461-46D0-AF71-79E0064B3758}"/>
               </a:ext>
             </a:extLst>
           </p:cNvPr>
@@ -2020,7 +2163,7 @@
           <p:cNvPr id="3" name="Title 2">
             <a:extLst>
               <a:ext uri="{FF2B5EF4-FFF2-40B4-BE49-F238E27FC236}">
-                <a16:creationId xmlns:a16="http://schemas.microsoft.com/office/drawing/2014/main" xmlns="" id="{F23A82FA-1F05-4BAB-8768-A4575B1AEA6A}"/>
+                <a16:creationId xmlns:a16="http://schemas.microsoft.com/office/drawing/2014/main" id="{F23A82FA-1F05-4BAB-8768-A4575B1AEA6A}"/>
               </a:ext>
             </a:extLst>
           </p:cNvPr>
@@ -2069,20 +2212,20 @@
     </p:spTree>
     <p:extLst>
       <p:ext uri="{BB962C8B-B14F-4D97-AF65-F5344CB8AC3E}">
-        <p14:creationId xmlns:p14="http://schemas.microsoft.com/office/powerpoint/2010/main" xmlns="" val="172072613"/>
+        <p14:creationId xmlns:p14="http://schemas.microsoft.com/office/powerpoint/2010/main" val="172072613"/>
       </p:ext>
     </p:extLst>
   </p:cSld>
   <p:clrMapOvr>
     <a:overrideClrMapping bg1="lt1" tx1="dk1" bg2="lt2" tx2="dk2" accent1="accent1" accent2="accent2" accent3="accent3" accent4="accent4" accent5="accent5" accent6="accent6" hlink="hlink" folHlink="folHlink"/>
   </p:clrMapOvr>
-  <mc:AlternateContent xmlns:mc="http://schemas.openxmlformats.org/markup-compatibility/2006">
-    <mc:Choice xmlns:p14="http://schemas.microsoft.com/office/powerpoint/2010/main" xmlns="" Requires="p14">
+  <mc:AlternateContent xmlns:mc="http://schemas.openxmlformats.org/markup-compatibility/2006" xmlns:p14="http://schemas.microsoft.com/office/powerpoint/2010/main">
+    <mc:Choice Requires="p14">
       <p:transition spd="med" p14:dur="700">
         <p:fade/>
       </p:transition>
     </mc:Choice>
-    <mc:Fallback>
+    <mc:Fallback xmlns="">
       <p:transition spd="med">
         <p:fade/>
       </p:transition>
@@ -2090,7 +2233,7 @@
   </mc:AlternateContent>
   <p:extLst>
     <p:ext uri="{DCECCB84-F9BA-43D5-87BE-67443E8EF086}">
-      <p15:sldGuideLst xmlns:p15="http://schemas.microsoft.com/office/powerpoint/2012/main" xmlns="">
+      <p15:sldGuideLst xmlns:p15="http://schemas.microsoft.com/office/powerpoint/2012/main">
         <p15:guide id="1" orient="horz" pos="2160">
           <p15:clr>
             <a:srgbClr val="FBAE40"/>
@@ -2147,7 +2290,7 @@
           <p:cNvPr id="3" name="Picture 2" descr="Chart, background pattern&#10;&#10;Description automatically generated">
             <a:extLst>
               <a:ext uri="{FF2B5EF4-FFF2-40B4-BE49-F238E27FC236}">
-                <a16:creationId xmlns:a16="http://schemas.microsoft.com/office/drawing/2014/main" xmlns="" id="{D02F07F5-7B28-4FAB-AE64-9567EE73DE58}"/>
+                <a16:creationId xmlns:a16="http://schemas.microsoft.com/office/drawing/2014/main" id="{D02F07F5-7B28-4FAB-AE64-9567EE73DE58}"/>
               </a:ext>
             </a:extLst>
           </p:cNvPr>
@@ -2160,7 +2303,7 @@
           <a:blip r:embed="rId2">
             <a:extLst>
               <a:ext uri="{28A0092B-C50C-407E-A947-70E740481C1C}">
-                <a14:useLocalDpi xmlns:a14="http://schemas.microsoft.com/office/drawing/2010/main" xmlns="" val="0"/>
+                <a14:useLocalDpi xmlns:a14="http://schemas.microsoft.com/office/drawing/2010/main" val="0"/>
               </a:ext>
             </a:extLst>
           </a:blip>
@@ -2182,7 +2325,7 @@
           <p:cNvPr id="12" name="Text Placeholder 15">
             <a:extLst>
               <a:ext uri="{FF2B5EF4-FFF2-40B4-BE49-F238E27FC236}">
-                <a16:creationId xmlns:a16="http://schemas.microsoft.com/office/drawing/2014/main" xmlns="" id="{E8DBED36-2461-46D0-AF71-79E0064B3758}"/>
+                <a16:creationId xmlns:a16="http://schemas.microsoft.com/office/drawing/2014/main" id="{E8DBED36-2461-46D0-AF71-79E0064B3758}"/>
               </a:ext>
             </a:extLst>
           </p:cNvPr>
@@ -2243,7 +2386,7 @@
           <p:cNvPr id="2" name="Title 1">
             <a:extLst>
               <a:ext uri="{FF2B5EF4-FFF2-40B4-BE49-F238E27FC236}">
-                <a16:creationId xmlns:a16="http://schemas.microsoft.com/office/drawing/2014/main" xmlns="" id="{13E3504F-F7AC-4961-8027-04414EA28A76}"/>
+                <a16:creationId xmlns:a16="http://schemas.microsoft.com/office/drawing/2014/main" id="{13E3504F-F7AC-4961-8027-04414EA28A76}"/>
               </a:ext>
             </a:extLst>
           </p:cNvPr>
@@ -2296,20 +2439,20 @@
     </p:spTree>
     <p:extLst>
       <p:ext uri="{BB962C8B-B14F-4D97-AF65-F5344CB8AC3E}">
-        <p14:creationId xmlns:p14="http://schemas.microsoft.com/office/powerpoint/2010/main" xmlns="" val="2189876105"/>
+        <p14:creationId xmlns:p14="http://schemas.microsoft.com/office/powerpoint/2010/main" val="2189876105"/>
       </p:ext>
     </p:extLst>
   </p:cSld>
   <p:clrMapOvr>
     <a:masterClrMapping/>
   </p:clrMapOvr>
-  <mc:AlternateContent xmlns:mc="http://schemas.openxmlformats.org/markup-compatibility/2006">
-    <mc:Choice xmlns:p14="http://schemas.microsoft.com/office/powerpoint/2010/main" xmlns="" Requires="p14">
+  <mc:AlternateContent xmlns:mc="http://schemas.openxmlformats.org/markup-compatibility/2006" xmlns:p14="http://schemas.microsoft.com/office/powerpoint/2010/main">
+    <mc:Choice Requires="p14">
       <p:transition spd="med" p14:dur="700">
         <p:fade/>
       </p:transition>
     </mc:Choice>
-    <mc:Fallback>
+    <mc:Fallback xmlns="">
       <p:transition spd="med">
         <p:fade/>
       </p:transition>
@@ -2317,7 +2460,7 @@
   </mc:AlternateContent>
   <p:extLst>
     <p:ext uri="{DCECCB84-F9BA-43D5-87BE-67443E8EF086}">
-      <p15:sldGuideLst xmlns:p15="http://schemas.microsoft.com/office/powerpoint/2012/main" xmlns="">
+      <p15:sldGuideLst xmlns:p15="http://schemas.microsoft.com/office/powerpoint/2012/main">
         <p15:guide id="1" orient="horz" pos="2160">
           <p15:clr>
             <a:srgbClr val="FBAE40"/>
@@ -2374,7 +2517,7 @@
           <p:cNvPr id="3" name="Picture 2" descr="Shape, arrow&#10;&#10;Description automatically generated">
             <a:extLst>
               <a:ext uri="{FF2B5EF4-FFF2-40B4-BE49-F238E27FC236}">
-                <a16:creationId xmlns:a16="http://schemas.microsoft.com/office/drawing/2014/main" xmlns="" id="{028401E1-3B09-44F5-B61D-E811BC24E22A}"/>
+                <a16:creationId xmlns:a16="http://schemas.microsoft.com/office/drawing/2014/main" id="{028401E1-3B09-44F5-B61D-E811BC24E22A}"/>
               </a:ext>
             </a:extLst>
           </p:cNvPr>
@@ -2388,7 +2531,7 @@
             <a:alphaModFix amt="35000"/>
             <a:extLst>
               <a:ext uri="{28A0092B-C50C-407E-A947-70E740481C1C}">
-                <a14:useLocalDpi xmlns:a14="http://schemas.microsoft.com/office/drawing/2010/main" xmlns="" val="0"/>
+                <a14:useLocalDpi xmlns:a14="http://schemas.microsoft.com/office/drawing/2010/main" val="0"/>
               </a:ext>
             </a:extLst>
           </a:blip>
@@ -2410,7 +2553,7 @@
           <p:cNvPr id="5" name="Title 1">
             <a:extLst>
               <a:ext uri="{FF2B5EF4-FFF2-40B4-BE49-F238E27FC236}">
-                <a16:creationId xmlns:a16="http://schemas.microsoft.com/office/drawing/2014/main" xmlns="" id="{3D9303A2-B30A-054C-B809-053B909E125F}"/>
+                <a16:creationId xmlns:a16="http://schemas.microsoft.com/office/drawing/2014/main" id="{3D9303A2-B30A-054C-B809-053B909E125F}"/>
               </a:ext>
             </a:extLst>
           </p:cNvPr>
@@ -2468,7 +2611,7 @@
           <p:cNvPr id="6" name="Text Placeholder 4">
             <a:extLst>
               <a:ext uri="{FF2B5EF4-FFF2-40B4-BE49-F238E27FC236}">
-                <a16:creationId xmlns:a16="http://schemas.microsoft.com/office/drawing/2014/main" xmlns="" id="{10F58DD1-3970-D84D-8040-EF33B0971D59}"/>
+                <a16:creationId xmlns:a16="http://schemas.microsoft.com/office/drawing/2014/main" id="{10F58DD1-3970-D84D-8040-EF33B0971D59}"/>
               </a:ext>
             </a:extLst>
           </p:cNvPr>
@@ -2525,20 +2668,20 @@
     </p:spTree>
     <p:extLst>
       <p:ext uri="{BB962C8B-B14F-4D97-AF65-F5344CB8AC3E}">
-        <p14:creationId xmlns:p14="http://schemas.microsoft.com/office/powerpoint/2010/main" xmlns="" val="3240882942"/>
+        <p14:creationId xmlns:p14="http://schemas.microsoft.com/office/powerpoint/2010/main" val="3240882942"/>
       </p:ext>
     </p:extLst>
   </p:cSld>
   <p:clrMapOvr>
     <a:masterClrMapping/>
   </p:clrMapOvr>
-  <mc:AlternateContent xmlns:mc="http://schemas.openxmlformats.org/markup-compatibility/2006">
-    <mc:Choice xmlns:p14="http://schemas.microsoft.com/office/powerpoint/2010/main" xmlns="" Requires="p14">
+  <mc:AlternateContent xmlns:mc="http://schemas.openxmlformats.org/markup-compatibility/2006" xmlns:p14="http://schemas.microsoft.com/office/powerpoint/2010/main">
+    <mc:Choice Requires="p14">
       <p:transition spd="med" p14:dur="700">
         <p:fade/>
       </p:transition>
     </mc:Choice>
-    <mc:Fallback>
+    <mc:Fallback xmlns="">
       <p:transition spd="med">
         <p:fade/>
       </p:transition>
@@ -2546,7 +2689,7 @@
   </mc:AlternateContent>
   <p:extLst>
     <p:ext uri="{DCECCB84-F9BA-43D5-87BE-67443E8EF086}">
-      <p15:sldGuideLst xmlns:p15="http://schemas.microsoft.com/office/powerpoint/2012/main" xmlns="">
+      <p15:sldGuideLst xmlns:p15="http://schemas.microsoft.com/office/powerpoint/2012/main">
         <p15:guide id="1" orient="horz" pos="2160">
           <p15:clr>
             <a:srgbClr val="FBAE40"/>
@@ -2603,7 +2746,7 @@
           <p:cNvPr id="14" name="Text Placeholder 4">
             <a:extLst>
               <a:ext uri="{FF2B5EF4-FFF2-40B4-BE49-F238E27FC236}">
-                <a16:creationId xmlns:a16="http://schemas.microsoft.com/office/drawing/2014/main" xmlns="" id="{1EEF53A4-35A6-4E43-B220-67DA381C5910}"/>
+                <a16:creationId xmlns:a16="http://schemas.microsoft.com/office/drawing/2014/main" id="{1EEF53A4-35A6-4E43-B220-67DA381C5910}"/>
               </a:ext>
             </a:extLst>
           </p:cNvPr>
@@ -2664,7 +2807,7 @@
           <p:cNvPr id="5" name="Title 1">
             <a:extLst>
               <a:ext uri="{FF2B5EF4-FFF2-40B4-BE49-F238E27FC236}">
-                <a16:creationId xmlns:a16="http://schemas.microsoft.com/office/drawing/2014/main" xmlns="" id="{07724906-4405-47F4-B533-7291B003B0A2}"/>
+                <a16:creationId xmlns:a16="http://schemas.microsoft.com/office/drawing/2014/main" id="{07724906-4405-47F4-B533-7291B003B0A2}"/>
               </a:ext>
             </a:extLst>
           </p:cNvPr>
@@ -2723,7 +2866,7 @@
           <p:cNvPr id="2" name="Picture 1" descr="Chart, background pattern&#10;&#10;Description automatically generated">
             <a:extLst>
               <a:ext uri="{FF2B5EF4-FFF2-40B4-BE49-F238E27FC236}">
-                <a16:creationId xmlns:a16="http://schemas.microsoft.com/office/drawing/2014/main" xmlns="" id="{F2674189-311A-4AD6-ACED-1AF38642799F}"/>
+                <a16:creationId xmlns:a16="http://schemas.microsoft.com/office/drawing/2014/main" id="{F2674189-311A-4AD6-ACED-1AF38642799F}"/>
               </a:ext>
             </a:extLst>
           </p:cNvPr>
@@ -2736,7 +2879,7 @@
           <a:blip r:embed="rId2">
             <a:extLst>
               <a:ext uri="{28A0092B-C50C-407E-A947-70E740481C1C}">
-                <a14:useLocalDpi xmlns:a14="http://schemas.microsoft.com/office/drawing/2010/main" xmlns="" val="0"/>
+                <a14:useLocalDpi xmlns:a14="http://schemas.microsoft.com/office/drawing/2010/main" val="0"/>
               </a:ext>
             </a:extLst>
           </a:blip>
@@ -2756,7 +2899,7 @@
     </p:spTree>
     <p:extLst>
       <p:ext uri="{BB962C8B-B14F-4D97-AF65-F5344CB8AC3E}">
-        <p14:creationId xmlns:p14="http://schemas.microsoft.com/office/powerpoint/2010/main" xmlns="" val="495523106"/>
+        <p14:creationId xmlns:p14="http://schemas.microsoft.com/office/powerpoint/2010/main" val="495523106"/>
       </p:ext>
     </p:extLst>
   </p:cSld>
@@ -2796,7 +2939,7 @@
           <p:cNvPr id="13" name="Title 1">
             <a:extLst>
               <a:ext uri="{FF2B5EF4-FFF2-40B4-BE49-F238E27FC236}">
-                <a16:creationId xmlns:a16="http://schemas.microsoft.com/office/drawing/2014/main" xmlns="" id="{BC00585D-E155-409A-899A-29BDF4E57FD3}"/>
+                <a16:creationId xmlns:a16="http://schemas.microsoft.com/office/drawing/2014/main" id="{BC00585D-E155-409A-899A-29BDF4E57FD3}"/>
               </a:ext>
             </a:extLst>
           </p:cNvPr>
@@ -2855,7 +2998,7 @@
           <p:cNvPr id="5" name="Text Placeholder 4">
             <a:extLst>
               <a:ext uri="{FF2B5EF4-FFF2-40B4-BE49-F238E27FC236}">
-                <a16:creationId xmlns:a16="http://schemas.microsoft.com/office/drawing/2014/main" xmlns="" id="{2D944D9B-AA15-4DB5-AE58-0FA514F6FE87}"/>
+                <a16:creationId xmlns:a16="http://schemas.microsoft.com/office/drawing/2014/main" id="{2D944D9B-AA15-4DB5-AE58-0FA514F6FE87}"/>
               </a:ext>
             </a:extLst>
           </p:cNvPr>
@@ -2916,7 +3059,7 @@
           <p:cNvPr id="2" name="Picture 1" descr="Chart, background pattern&#10;&#10;Description automatically generated">
             <a:extLst>
               <a:ext uri="{FF2B5EF4-FFF2-40B4-BE49-F238E27FC236}">
-                <a16:creationId xmlns:a16="http://schemas.microsoft.com/office/drawing/2014/main" xmlns="" id="{75AA916B-1CCB-46CB-9D3B-BAF329AD02FA}"/>
+                <a16:creationId xmlns:a16="http://schemas.microsoft.com/office/drawing/2014/main" id="{75AA916B-1CCB-46CB-9D3B-BAF329AD02FA}"/>
               </a:ext>
             </a:extLst>
           </p:cNvPr>
@@ -2929,7 +3072,7 @@
           <a:blip r:embed="rId2">
             <a:extLst>
               <a:ext uri="{28A0092B-C50C-407E-A947-70E740481C1C}">
-                <a14:useLocalDpi xmlns:a14="http://schemas.microsoft.com/office/drawing/2010/main" xmlns="" val="0"/>
+                <a14:useLocalDpi xmlns:a14="http://schemas.microsoft.com/office/drawing/2010/main" val="0"/>
               </a:ext>
             </a:extLst>
           </a:blip>
@@ -2949,7 +3092,7 @@
     </p:spTree>
     <p:extLst>
       <p:ext uri="{BB962C8B-B14F-4D97-AF65-F5344CB8AC3E}">
-        <p14:creationId xmlns:p14="http://schemas.microsoft.com/office/powerpoint/2010/main" xmlns="" val="2499009600"/>
+        <p14:creationId xmlns:p14="http://schemas.microsoft.com/office/powerpoint/2010/main" val="2499009600"/>
       </p:ext>
     </p:extLst>
   </p:cSld>
@@ -2989,7 +3132,7 @@
           <p:cNvPr id="22" name="Text Placeholder 21">
             <a:extLst>
               <a:ext uri="{FF2B5EF4-FFF2-40B4-BE49-F238E27FC236}">
-                <a16:creationId xmlns:a16="http://schemas.microsoft.com/office/drawing/2014/main" xmlns="" id="{CC31B5EA-A920-4B2A-8F05-3C688980E26F}"/>
+                <a16:creationId xmlns:a16="http://schemas.microsoft.com/office/drawing/2014/main" id="{CC31B5EA-A920-4B2A-8F05-3C688980E26F}"/>
               </a:ext>
             </a:extLst>
           </p:cNvPr>
@@ -3099,7 +3242,7 @@
           <p:cNvPr id="16" name="Picture Placeholder 15">
             <a:extLst>
               <a:ext uri="{FF2B5EF4-FFF2-40B4-BE49-F238E27FC236}">
-                <a16:creationId xmlns:a16="http://schemas.microsoft.com/office/drawing/2014/main" xmlns="" id="{FE42B32E-80DC-4AC0-B306-CE8E5CCD934F}"/>
+                <a16:creationId xmlns:a16="http://schemas.microsoft.com/office/drawing/2014/main" id="{FE42B32E-80DC-4AC0-B306-CE8E5CCD934F}"/>
               </a:ext>
             </a:extLst>
           </p:cNvPr>
@@ -3145,7 +3288,7 @@
           <p:cNvPr id="20" name="Picture Placeholder 15">
             <a:extLst>
               <a:ext uri="{FF2B5EF4-FFF2-40B4-BE49-F238E27FC236}">
-                <a16:creationId xmlns:a16="http://schemas.microsoft.com/office/drawing/2014/main" xmlns="" id="{A4E97807-A99D-4012-BE47-7B3C54B502FA}"/>
+                <a16:creationId xmlns:a16="http://schemas.microsoft.com/office/drawing/2014/main" id="{A4E97807-A99D-4012-BE47-7B3C54B502FA}"/>
               </a:ext>
             </a:extLst>
           </p:cNvPr>
@@ -3191,7 +3334,7 @@
           <p:cNvPr id="21" name="Picture Placeholder 15">
             <a:extLst>
               <a:ext uri="{FF2B5EF4-FFF2-40B4-BE49-F238E27FC236}">
-                <a16:creationId xmlns:a16="http://schemas.microsoft.com/office/drawing/2014/main" xmlns="" id="{31025974-D850-4FC0-B6B0-BBF7DFCE1ECE}"/>
+                <a16:creationId xmlns:a16="http://schemas.microsoft.com/office/drawing/2014/main" id="{31025974-D850-4FC0-B6B0-BBF7DFCE1ECE}"/>
               </a:ext>
             </a:extLst>
           </p:cNvPr>
@@ -3237,7 +3380,7 @@
           <p:cNvPr id="19" name="Text Placeholder 4">
             <a:extLst>
               <a:ext uri="{FF2B5EF4-FFF2-40B4-BE49-F238E27FC236}">
-                <a16:creationId xmlns:a16="http://schemas.microsoft.com/office/drawing/2014/main" xmlns="" id="{3E65ED86-A26C-479A-8393-0BFDCBCD43F2}"/>
+                <a16:creationId xmlns:a16="http://schemas.microsoft.com/office/drawing/2014/main" id="{3E65ED86-A26C-479A-8393-0BFDCBCD43F2}"/>
               </a:ext>
             </a:extLst>
           </p:cNvPr>
@@ -3298,7 +3441,7 @@
           <p:cNvPr id="4" name="Title 1">
             <a:extLst>
               <a:ext uri="{FF2B5EF4-FFF2-40B4-BE49-F238E27FC236}">
-                <a16:creationId xmlns:a16="http://schemas.microsoft.com/office/drawing/2014/main" xmlns="" id="{F858EEFF-117E-4B86-B6B2-CD8F71AA8C4A}"/>
+                <a16:creationId xmlns:a16="http://schemas.microsoft.com/office/drawing/2014/main" id="{F858EEFF-117E-4B86-B6B2-CD8F71AA8C4A}"/>
               </a:ext>
             </a:extLst>
           </p:cNvPr>
@@ -3357,7 +3500,7 @@
           <p:cNvPr id="23" name="Text Placeholder 21">
             <a:extLst>
               <a:ext uri="{FF2B5EF4-FFF2-40B4-BE49-F238E27FC236}">
-                <a16:creationId xmlns:a16="http://schemas.microsoft.com/office/drawing/2014/main" xmlns="" id="{C073AF55-A66A-4112-A82D-E09A3D14EDBE}"/>
+                <a16:creationId xmlns:a16="http://schemas.microsoft.com/office/drawing/2014/main" id="{C073AF55-A66A-4112-A82D-E09A3D14EDBE}"/>
               </a:ext>
             </a:extLst>
           </p:cNvPr>
@@ -3467,7 +3610,7 @@
           <p:cNvPr id="24" name="Text Placeholder 21">
             <a:extLst>
               <a:ext uri="{FF2B5EF4-FFF2-40B4-BE49-F238E27FC236}">
-                <a16:creationId xmlns:a16="http://schemas.microsoft.com/office/drawing/2014/main" xmlns="" id="{CBC8787E-EB24-4D42-8555-6C6C11DD51B3}"/>
+                <a16:creationId xmlns:a16="http://schemas.microsoft.com/office/drawing/2014/main" id="{CBC8787E-EB24-4D42-8555-6C6C11DD51B3}"/>
               </a:ext>
             </a:extLst>
           </p:cNvPr>
@@ -3575,7 +3718,7 @@
     </p:spTree>
     <p:extLst>
       <p:ext uri="{BB962C8B-B14F-4D97-AF65-F5344CB8AC3E}">
-        <p14:creationId xmlns:p14="http://schemas.microsoft.com/office/powerpoint/2010/main" xmlns="" val="1422917410"/>
+        <p14:creationId xmlns:p14="http://schemas.microsoft.com/office/powerpoint/2010/main" val="1422917410"/>
       </p:ext>
     </p:extLst>
   </p:cSld>
@@ -3829,7 +3972,7 @@
     </p:spTree>
     <p:extLst>
       <p:ext uri="{BB962C8B-B14F-4D97-AF65-F5344CB8AC3E}">
-        <p14:creationId xmlns:p14="http://schemas.microsoft.com/office/powerpoint/2010/main" xmlns="" val="3429690444"/>
+        <p14:creationId xmlns:p14="http://schemas.microsoft.com/office/powerpoint/2010/main" val="3429690444"/>
       </p:ext>
     </p:extLst>
   </p:cSld>
@@ -4159,7 +4302,7 @@
           <p:cNvPr id="3074" name="Rectangle 2">
             <a:extLst>
               <a:ext uri="{FF2B5EF4-FFF2-40B4-BE49-F238E27FC236}">
-                <a16:creationId xmlns:a16="http://schemas.microsoft.com/office/drawing/2014/main" xmlns="" id="{ED2DB031-9003-4F74-A88F-FE2A2ABABC72}"/>
+                <a16:creationId xmlns:a16="http://schemas.microsoft.com/office/drawing/2014/main" id="{ED2DB031-9003-4F74-A88F-FE2A2ABABC72}"/>
               </a:ext>
             </a:extLst>
           </p:cNvPr>
@@ -4205,7 +4348,7 @@
           <p:cNvPr id="3" name="Rectangle 2">
             <a:extLst>
               <a:ext uri="{FF2B5EF4-FFF2-40B4-BE49-F238E27FC236}">
-                <a16:creationId xmlns:a16="http://schemas.microsoft.com/office/drawing/2014/main" xmlns="" id="{ED2DB031-9003-4F74-A88F-FE2A2ABABC72}"/>
+                <a16:creationId xmlns:a16="http://schemas.microsoft.com/office/drawing/2014/main" id="{ED2DB031-9003-4F74-A88F-FE2A2ABABC72}"/>
               </a:ext>
             </a:extLst>
           </p:cNvPr>
@@ -4229,14 +4372,6 @@
           <a:lstStyle/>
           <a:p>
             <a:pPr eaLnBrk="1" hangingPunct="1"/>
-            <a:r>
-              <a:rPr lang="en-US" altLang="en-US" sz="6000" b="1" dirty="0">
-                <a:solidFill>
-                  <a:schemeClr val="accent2"/>
-                </a:solidFill>
-              </a:rPr>
-              <a:t/>
-            </a:r>
             <a:br>
               <a:rPr lang="en-US" altLang="en-US" sz="6000" b="1" dirty="0">
                 <a:solidFill>
@@ -4280,20 +4415,20 @@
     </p:spTree>
     <p:extLst>
       <p:ext uri="{BB962C8B-B14F-4D97-AF65-F5344CB8AC3E}">
-        <p14:creationId xmlns:p14="http://schemas.microsoft.com/office/powerpoint/2010/main" xmlns="" val="1543265293"/>
+        <p14:creationId xmlns:p14="http://schemas.microsoft.com/office/powerpoint/2010/main" val="1543265293"/>
       </p:ext>
     </p:extLst>
   </p:cSld>
   <p:clrMapOvr>
     <a:masterClrMapping/>
   </p:clrMapOvr>
-  <mc:AlternateContent xmlns:mc="http://schemas.openxmlformats.org/markup-compatibility/2006">
-    <mc:Choice xmlns:p14="http://schemas.microsoft.com/office/powerpoint/2010/main" xmlns="" Requires="p14">
+  <mc:AlternateContent xmlns:mc="http://schemas.openxmlformats.org/markup-compatibility/2006" xmlns:p14="http://schemas.microsoft.com/office/powerpoint/2010/main">
+    <mc:Choice Requires="p14">
       <p:transition spd="med" p14:dur="700">
         <p:fade/>
       </p:transition>
     </mc:Choice>
-    <mc:Fallback>
+    <mc:Fallback xmlns="">
       <p:transition spd="med">
         <p:fade/>
       </p:transition>
@@ -4332,7 +4467,7 @@
           <p:cNvPr id="4" name="Title 3">
             <a:extLst>
               <a:ext uri="{FF2B5EF4-FFF2-40B4-BE49-F238E27FC236}">
-                <a16:creationId xmlns:a16="http://schemas.microsoft.com/office/drawing/2014/main" xmlns="" id="{FD9E38B3-4686-8247-9625-49018D29F408}"/>
+                <a16:creationId xmlns:a16="http://schemas.microsoft.com/office/drawing/2014/main" id="{FD9E38B3-4686-8247-9625-49018D29F408}"/>
               </a:ext>
             </a:extLst>
           </p:cNvPr>
@@ -4371,7 +4506,7 @@
           <p:cNvPr id="3" name="Text Placeholder 2">
             <a:extLst>
               <a:ext uri="{FF2B5EF4-FFF2-40B4-BE49-F238E27FC236}">
-                <a16:creationId xmlns:a16="http://schemas.microsoft.com/office/drawing/2014/main" xmlns="" id="{17155E1D-F4AD-41A7-B948-E2D246CCFE8A}"/>
+                <a16:creationId xmlns:a16="http://schemas.microsoft.com/office/drawing/2014/main" id="{17155E1D-F4AD-41A7-B948-E2D246CCFE8A}"/>
               </a:ext>
             </a:extLst>
           </p:cNvPr>
@@ -4449,10 +4584,6 @@
               <a:rPr lang="en-US" sz="2400" b="1" dirty="0"/>
               <a:t>	Total Navajos</a:t>
             </a:r>
-            <a:r>
-              <a:rPr lang="en-US" sz="2400" dirty="0"/>
-              <a:t/>
-            </a:r>
             <a:br>
               <a:rPr lang="en-US" sz="2400" dirty="0"/>
             </a:br>
@@ -4506,10 +4637,6 @@
           </a:p>
           <a:p>
             <a:pPr algn="r"/>
-            <a:r>
-              <a:rPr lang="en-US" sz="1600" dirty="0"/>
-              <a:t/>
-            </a:r>
             <a:br>
               <a:rPr lang="en-US" sz="1600" dirty="0"/>
             </a:br>
@@ -4538,7 +4665,7 @@
           <p:cNvPr id="5" name="Title 3">
             <a:extLst>
               <a:ext uri="{FF2B5EF4-FFF2-40B4-BE49-F238E27FC236}">
-                <a16:creationId xmlns:a16="http://schemas.microsoft.com/office/drawing/2014/main" xmlns="" id="{048FBE6B-DC67-4E64-80F4-CADE978D2FE3}"/>
+                <a16:creationId xmlns:a16="http://schemas.microsoft.com/office/drawing/2014/main" id="{048FBE6B-DC67-4E64-80F4-CADE978D2FE3}"/>
               </a:ext>
             </a:extLst>
           </p:cNvPr>
@@ -4617,20 +4744,20 @@
     </p:spTree>
     <p:extLst>
       <p:ext uri="{BB962C8B-B14F-4D97-AF65-F5344CB8AC3E}">
-        <p14:creationId xmlns:p14="http://schemas.microsoft.com/office/powerpoint/2010/main" xmlns="" val="4244761525"/>
+        <p14:creationId xmlns:p14="http://schemas.microsoft.com/office/powerpoint/2010/main" val="4244761525"/>
       </p:ext>
     </p:extLst>
   </p:cSld>
   <p:clrMapOvr>
     <a:masterClrMapping/>
   </p:clrMapOvr>
-  <mc:AlternateContent xmlns:mc="http://schemas.openxmlformats.org/markup-compatibility/2006">
-    <mc:Choice xmlns:p14="http://schemas.microsoft.com/office/powerpoint/2010/main" xmlns="" Requires="p14">
+  <mc:AlternateContent xmlns:mc="http://schemas.openxmlformats.org/markup-compatibility/2006" xmlns:p14="http://schemas.microsoft.com/office/powerpoint/2010/main">
+    <mc:Choice Requires="p14">
       <p:transition spd="med" p14:dur="700">
         <p:fade/>
       </p:transition>
     </mc:Choice>
-    <mc:Fallback>
+    <mc:Fallback xmlns="">
       <p:transition spd="med">
         <p:fade/>
       </p:transition>
@@ -4695,15 +4822,7 @@
             </a:pPr>
             <a:r>
               <a:rPr lang="en-US" sz="2400" dirty="0"/>
-              <a:t> Is there a significant difference in the number of cases and deaths from the spread of COVID-19 effecting the population in the states of AZ and NM by comparing the Navajo Nation </a:t>
-            </a:r>
-            <a:r>
-              <a:rPr lang="en-US" sz="2400" dirty="0" err="1"/>
-              <a:t>vs</a:t>
-            </a:r>
-            <a:r>
-              <a:rPr lang="en-US" sz="2400" dirty="0"/>
-              <a:t> Non-Navajo Nation lands?  </a:t>
+              <a:t> Is there a significant difference in the number of cases and deaths from the spread of COVID-19 effecting the population in the states of AZ and NM by comparing the Navajo Nation vs. Non-Navajo Nation lands?  </a:t>
             </a:r>
           </a:p>
           <a:p>
@@ -4733,7 +4852,7 @@
           <p:cNvPr id="4" name="Title 3">
             <a:extLst>
               <a:ext uri="{FF2B5EF4-FFF2-40B4-BE49-F238E27FC236}">
-                <a16:creationId xmlns:a16="http://schemas.microsoft.com/office/drawing/2014/main" xmlns="" id="{048FBE6B-DC67-4E64-80F4-CADE978D2FE3}"/>
+                <a16:creationId xmlns:a16="http://schemas.microsoft.com/office/drawing/2014/main" id="{048FBE6B-DC67-4E64-80F4-CADE978D2FE3}"/>
               </a:ext>
             </a:extLst>
           </p:cNvPr>
@@ -5009,7 +5128,7 @@
           <p:cNvPr id="6" name="Title 3">
             <a:extLst>
               <a:ext uri="{FF2B5EF4-FFF2-40B4-BE49-F238E27FC236}">
-                <a16:creationId xmlns:a16="http://schemas.microsoft.com/office/drawing/2014/main" xmlns="" id="{048FBE6B-DC67-4E64-80F4-CADE978D2FE3}"/>
+                <a16:creationId xmlns:a16="http://schemas.microsoft.com/office/drawing/2014/main" id="{048FBE6B-DC67-4E64-80F4-CADE978D2FE3}"/>
               </a:ext>
             </a:extLst>
           </p:cNvPr>
@@ -5090,13 +5209,13 @@
   <p:clrMapOvr>
     <a:masterClrMapping/>
   </p:clrMapOvr>
-  <mc:AlternateContent xmlns:mc="http://schemas.openxmlformats.org/markup-compatibility/2006">
-    <mc:Choice xmlns:p14="http://schemas.microsoft.com/office/powerpoint/2010/main" xmlns="" Requires="p14">
+  <mc:AlternateContent xmlns:mc="http://schemas.openxmlformats.org/markup-compatibility/2006" xmlns:p14="http://schemas.microsoft.com/office/powerpoint/2010/main">
+    <mc:Choice Requires="p14">
       <p:transition spd="med" p14:dur="700">
         <p:fade/>
       </p:transition>
     </mc:Choice>
-    <mc:Fallback>
+    <mc:Fallback xmlns="">
       <p:transition spd="med">
         <p:fade/>
       </p:transition>
@@ -5149,23 +5268,7 @@
             </a:r>
             <a:r>
               <a:rPr lang="en-US" dirty="0"/>
-              <a:t> </a:t>
-            </a:r>
-            <a:r>
-              <a:rPr lang="en-US" dirty="0" smtClean="0"/>
-              <a:t>was used </a:t>
-            </a:r>
-            <a:r>
-              <a:rPr lang="en-US" dirty="0"/>
-              <a:t>to download the data from JHU CSSE, store the data, and share </a:t>
-            </a:r>
-            <a:r>
-              <a:rPr lang="en-US" dirty="0" smtClean="0"/>
-              <a:t>it among </a:t>
-            </a:r>
-            <a:r>
-              <a:rPr lang="en-US" dirty="0"/>
-              <a:t>our three team members. </a:t>
+              <a:t> was used to download the data from JHU CSSE, store the data, and share among team members. </a:t>
             </a:r>
           </a:p>
           <a:p>
@@ -5418,7 +5521,7 @@
           <p:cNvPr id="4" name="Title 3">
             <a:extLst>
               <a:ext uri="{FF2B5EF4-FFF2-40B4-BE49-F238E27FC236}">
-                <a16:creationId xmlns:a16="http://schemas.microsoft.com/office/drawing/2014/main" xmlns="" id="{048FBE6B-DC67-4E64-80F4-CADE978D2FE3}"/>
+                <a16:creationId xmlns:a16="http://schemas.microsoft.com/office/drawing/2014/main" id="{048FBE6B-DC67-4E64-80F4-CADE978D2FE3}"/>
               </a:ext>
             </a:extLst>
           </p:cNvPr>
@@ -5569,15 +5672,7 @@
             <a:pPr lvl="1"/>
             <a:r>
               <a:rPr lang="en-US" sz="2600" dirty="0"/>
-              <a:t>Data research, analysis, </a:t>
-            </a:r>
-            <a:r>
-              <a:rPr lang="en-US" sz="2600" dirty="0" smtClean="0"/>
-              <a:t>and exploration</a:t>
-            </a:r>
-            <a:r>
-              <a:rPr lang="en-US" sz="2600" dirty="0"/>
-              <a:t>:</a:t>
+              <a:t>Data research, analysis, and exploration:</a:t>
             </a:r>
           </a:p>
           <a:p>
@@ -5656,7 +5751,7 @@
           <p:cNvPr id="6" name="Title 3">
             <a:extLst>
               <a:ext uri="{FF2B5EF4-FFF2-40B4-BE49-F238E27FC236}">
-                <a16:creationId xmlns:a16="http://schemas.microsoft.com/office/drawing/2014/main" xmlns="" id="{048FBE6B-DC67-4E64-80F4-CADE978D2FE3}"/>
+                <a16:creationId xmlns:a16="http://schemas.microsoft.com/office/drawing/2014/main" id="{048FBE6B-DC67-4E64-80F4-CADE978D2FE3}"/>
               </a:ext>
             </a:extLst>
           </p:cNvPr>
@@ -5737,13 +5832,13 @@
   <p:clrMapOvr>
     <a:masterClrMapping/>
   </p:clrMapOvr>
-  <mc:AlternateContent xmlns:mc="http://schemas.openxmlformats.org/markup-compatibility/2006">
-    <mc:Choice xmlns:p14="http://schemas.microsoft.com/office/powerpoint/2010/main" xmlns="" Requires="p14">
+  <mc:AlternateContent xmlns:mc="http://schemas.openxmlformats.org/markup-compatibility/2006" xmlns:p14="http://schemas.microsoft.com/office/powerpoint/2010/main">
+    <mc:Choice Requires="p14">
       <p:transition spd="med" p14:dur="700">
         <p:fade/>
       </p:transition>
     </mc:Choice>
-    <mc:Fallback>
+    <mc:Fallback xmlns="">
       <p:transition spd="med">
         <p:fade/>
       </p:transition>
@@ -5820,12 +5915,12 @@
                   <a:schemeClr val="bg1"/>
                 </a:solidFill>
               </a:rPr>
-              <a:t>	An ANOVA is an analysis of variant and is used to compare two variables against each other. </a:t>
+              <a:t>	An ANOVA is an analysis of variance and is used to compare two variables against each other. </a:t>
             </a:r>
           </a:p>
           <a:p>
             <a:pPr lvl="1"/>
-            <a:endParaRPr lang="en-US" sz="1800" dirty="0" smtClean="0">
+            <a:endParaRPr lang="en-US" sz="1800" dirty="0">
               <a:solidFill>
                 <a:schemeClr val="bg1"/>
               </a:solidFill>
@@ -5833,21 +5928,13 @@
           </a:p>
           <a:p>
             <a:pPr lvl="1"/>
-            <a:r>
-              <a:rPr lang="en-US" sz="1800" dirty="0" smtClean="0">
-                <a:solidFill>
-                  <a:schemeClr val="bg1"/>
-                </a:solidFill>
-              </a:rPr>
-              <a:t>The </a:t>
-            </a:r>
             <a:r>
               <a:rPr lang="en-US" sz="1800" dirty="0">
                 <a:solidFill>
                   <a:schemeClr val="bg1"/>
                 </a:solidFill>
               </a:rPr>
-              <a:t>variables compared were four variables from the dataset:</a:t>
+              <a:t>The variables compared were four variables from the dataset:</a:t>
             </a:r>
           </a:p>
           <a:p>
@@ -6003,7 +6090,7 @@
           <p:cNvPr id="4" name="Title 3">
             <a:extLst>
               <a:ext uri="{FF2B5EF4-FFF2-40B4-BE49-F238E27FC236}">
-                <a16:creationId xmlns:a16="http://schemas.microsoft.com/office/drawing/2014/main" xmlns="" id="{048FBE6B-DC67-4E64-80F4-CADE978D2FE3}"/>
+                <a16:creationId xmlns:a16="http://schemas.microsoft.com/office/drawing/2014/main" id="{048FBE6B-DC67-4E64-80F4-CADE978D2FE3}"/>
               </a:ext>
             </a:extLst>
           </p:cNvPr>
@@ -6154,15 +6241,7 @@
             <a:pPr marL="1371600" lvl="2" indent="-457200"/>
             <a:r>
               <a:rPr lang="en-US" sz="2200" dirty="0"/>
-              <a:t>The following libraries </a:t>
-            </a:r>
-            <a:r>
-              <a:rPr lang="en-US" sz="2200" dirty="0" smtClean="0"/>
-              <a:t>in R were used to </a:t>
-            </a:r>
-            <a:r>
-              <a:rPr lang="en-US" sz="2200" dirty="0"/>
-              <a:t>complete the analyses: </a:t>
+              <a:t>The following libraries in R were used to complete the analyses: </a:t>
             </a:r>
           </a:p>
           <a:p>
@@ -6233,12 +6312,8 @@
           <a:p>
             <a:pPr marL="1371600" lvl="2" indent="-457200"/>
             <a:r>
-              <a:rPr lang="en-US" sz="2200" dirty="0" smtClean="0"/>
-              <a:t>ANOVAs </a:t>
-            </a:r>
-            <a:r>
               <a:rPr lang="en-US" sz="2200" dirty="0"/>
-              <a:t>run on each of the variables comparing them and sorting them as a  binary variable that was either NAVAJO (1) or NON-NAVAJO (0) land locations.   </a:t>
+              <a:t>ANOVAs run on each of the variables comparing them and sorting them as a  binary variable that was either NAVAJO (1) or NON-NAVAJO (0) land locations.   </a:t>
             </a:r>
           </a:p>
           <a:p>
@@ -6285,7 +6360,7 @@
           <p:cNvPr id="6" name="Title 3">
             <a:extLst>
               <a:ext uri="{FF2B5EF4-FFF2-40B4-BE49-F238E27FC236}">
-                <a16:creationId xmlns:a16="http://schemas.microsoft.com/office/drawing/2014/main" xmlns="" id="{048FBE6B-DC67-4E64-80F4-CADE978D2FE3}"/>
+                <a16:creationId xmlns:a16="http://schemas.microsoft.com/office/drawing/2014/main" id="{048FBE6B-DC67-4E64-80F4-CADE978D2FE3}"/>
               </a:ext>
             </a:extLst>
           </p:cNvPr>
@@ -6366,13 +6441,13 @@
   <p:clrMapOvr>
     <a:masterClrMapping/>
   </p:clrMapOvr>
-  <mc:AlternateContent xmlns:mc="http://schemas.openxmlformats.org/markup-compatibility/2006">
-    <mc:Choice xmlns:p14="http://schemas.microsoft.com/office/powerpoint/2010/main" xmlns="" Requires="p14">
+  <mc:AlternateContent xmlns:mc="http://schemas.openxmlformats.org/markup-compatibility/2006" xmlns:p14="http://schemas.microsoft.com/office/powerpoint/2010/main">
+    <mc:Choice Requires="p14">
       <p:transition spd="med" p14:dur="700">
         <p:fade/>
       </p:transition>
     </mc:Choice>
-    <mc:Fallback>
+    <mc:Fallback xmlns="">
       <p:transition spd="med">
         <p:fade/>
       </p:transition>
@@ -6607,7 +6682,7 @@
           <p:cNvPr id="4" name="Title 3">
             <a:extLst>
               <a:ext uri="{FF2B5EF4-FFF2-40B4-BE49-F238E27FC236}">
-                <a16:creationId xmlns:a16="http://schemas.microsoft.com/office/drawing/2014/main" xmlns="" id="{048FBE6B-DC67-4E64-80F4-CADE978D2FE3}"/>
+                <a16:creationId xmlns:a16="http://schemas.microsoft.com/office/drawing/2014/main" id="{048FBE6B-DC67-4E64-80F4-CADE978D2FE3}"/>
               </a:ext>
             </a:extLst>
           </p:cNvPr>
@@ -6811,7 +6886,7 @@
           <p:cNvPr id="6" name="Title 3">
             <a:extLst>
               <a:ext uri="{FF2B5EF4-FFF2-40B4-BE49-F238E27FC236}">
-                <a16:creationId xmlns:a16="http://schemas.microsoft.com/office/drawing/2014/main" xmlns="" id="{048FBE6B-DC67-4E64-80F4-CADE978D2FE3}"/>
+                <a16:creationId xmlns:a16="http://schemas.microsoft.com/office/drawing/2014/main" id="{048FBE6B-DC67-4E64-80F4-CADE978D2FE3}"/>
               </a:ext>
             </a:extLst>
           </p:cNvPr>
@@ -7141,27 +7216,13 @@
                 <a:ea typeface="+mn-ea"/>
                 <a:cs typeface="+mn-cs"/>
               </a:rPr>
-              <a:t>Naked eye can see the </a:t>
-            </a:r>
-            <a:r>
-              <a:rPr kumimoji="0" lang="en-US" sz="1800" b="0" i="0" u="none" strike="noStrike" kern="1200" cap="none" spc="0" normalizeH="0" baseline="0" noProof="0" dirty="0" err="1">
-                <a:ln>
-                  <a:noFill/>
-                </a:ln>
-                <a:effectLst/>
-                <a:uLnTx/>
-                <a:uFillTx/>
-                <a:latin typeface="+mn-lt"/>
-                <a:ea typeface="+mn-ea"/>
-                <a:cs typeface="+mn-cs"/>
-              </a:rPr>
-              <a:t>significan</a:t>
+              <a:t>Naked eye assessment shows significant</a:t>
             </a:r>
             <a:r>
               <a:rPr lang="en-US" dirty="0">
                 <a:latin typeface="+mn-lt"/>
               </a:rPr>
-              <a:t>t differences between the two variables</a:t>
+              <a:t> differences between the two variables</a:t>
             </a:r>
             <a:endParaRPr kumimoji="0" lang="en-US" sz="1800" b="0" i="0" u="none" strike="noStrike" kern="1200" cap="none" spc="0" normalizeH="0" baseline="0" noProof="0" dirty="0">
               <a:ln>
@@ -7475,13 +7536,13 @@
   <p:clrMapOvr>
     <a:masterClrMapping/>
   </p:clrMapOvr>
-  <mc:AlternateContent xmlns:mc="http://schemas.openxmlformats.org/markup-compatibility/2006">
-    <mc:Choice xmlns:p14="http://schemas.microsoft.com/office/powerpoint/2010/main" xmlns="" Requires="p14">
+  <mc:AlternateContent xmlns:mc="http://schemas.openxmlformats.org/markup-compatibility/2006" xmlns:p14="http://schemas.microsoft.com/office/powerpoint/2010/main">
+    <mc:Choice Requires="p14">
       <p:transition spd="med" p14:dur="700">
         <p:fade/>
       </p:transition>
     </mc:Choice>
-    <mc:Fallback>
+    <mc:Fallback xmlns="">
       <p:transition spd="med">
         <p:fade/>
       </p:transition>
@@ -7539,7 +7600,7 @@
           <p:cNvPr id="4" name="Title 3">
             <a:extLst>
               <a:ext uri="{FF2B5EF4-FFF2-40B4-BE49-F238E27FC236}">
-                <a16:creationId xmlns:a16="http://schemas.microsoft.com/office/drawing/2014/main" xmlns="" id="{048FBE6B-DC67-4E64-80F4-CADE978D2FE3}"/>
+                <a16:creationId xmlns:a16="http://schemas.microsoft.com/office/drawing/2014/main" id="{048FBE6B-DC67-4E64-80F4-CADE978D2FE3}"/>
               </a:ext>
             </a:extLst>
           </p:cNvPr>
@@ -8066,7 +8127,7 @@
           <p:cNvPr id="6" name="Title 5">
             <a:extLst>
               <a:ext uri="{FF2B5EF4-FFF2-40B4-BE49-F238E27FC236}">
-                <a16:creationId xmlns:a16="http://schemas.microsoft.com/office/drawing/2014/main" xmlns="" id="{C56504DE-4F83-437F-BDB6-306374C31C9C}"/>
+                <a16:creationId xmlns:a16="http://schemas.microsoft.com/office/drawing/2014/main" id="{C56504DE-4F83-437F-BDB6-306374C31C9C}"/>
               </a:ext>
             </a:extLst>
           </p:cNvPr>
@@ -8103,7 +8164,7 @@
           <p:cNvPr id="2" name="Text Placeholder 1">
             <a:extLst>
               <a:ext uri="{FF2B5EF4-FFF2-40B4-BE49-F238E27FC236}">
-                <a16:creationId xmlns:a16="http://schemas.microsoft.com/office/drawing/2014/main" xmlns="" id="{3F36812B-2065-4A2B-B59B-8957022687BC}"/>
+                <a16:creationId xmlns:a16="http://schemas.microsoft.com/office/drawing/2014/main" id="{3F36812B-2065-4A2B-B59B-8957022687BC}"/>
               </a:ext>
             </a:extLst>
           </p:cNvPr>
@@ -8134,7 +8195,7 @@
             </a:pPr>
             <a:r>
               <a:rPr lang="en-US" altLang="en-US" sz="1800" dirty="0"/>
-              <a:t>Since January of 2020 Covid-19 has become a Global Pandemic </a:t>
+              <a:t>Since January of 2020 Covid-19 has become a Global Pandemic.</a:t>
             </a:r>
           </a:p>
           <a:p>
@@ -8147,7 +8208,7 @@
             <a:endParaRPr lang="en-US" altLang="en-US" sz="1800" dirty="0"/>
           </a:p>
           <a:p>
-            <a:pPr marL="0" indent="0" fontAlgn="auto">
+            <a:pPr marL="0" indent="0" algn="ctr" fontAlgn="auto">
               <a:spcAft>
                 <a:spcPts val="0"/>
               </a:spcAft>
@@ -8159,7 +8220,7 @@
             </a:r>
           </a:p>
           <a:p>
-            <a:pPr marL="0" indent="0" fontAlgn="auto">
+            <a:pPr marL="0" indent="0" algn="ctr" fontAlgn="auto">
               <a:spcAft>
                 <a:spcPts val="0"/>
               </a:spcAft>
@@ -8171,7 +8232,7 @@
             </a:r>
           </a:p>
           <a:p>
-            <a:pPr marL="0" indent="0" fontAlgn="auto">
+            <a:pPr marL="0" indent="0" algn="ctr" fontAlgn="auto">
               <a:spcAft>
                 <a:spcPts val="0"/>
               </a:spcAft>
@@ -8183,7 +8244,7 @@
             </a:r>
           </a:p>
           <a:p>
-            <a:pPr marL="0" indent="0" fontAlgn="auto">
+            <a:pPr marL="0" indent="0" algn="ctr" fontAlgn="auto">
               <a:spcAft>
                 <a:spcPts val="0"/>
               </a:spcAft>
@@ -8195,7 +8256,7 @@
             </a:r>
           </a:p>
           <a:p>
-            <a:pPr marL="0" indent="0" fontAlgn="auto">
+            <a:pPr marL="0" indent="0" algn="ctr" fontAlgn="auto">
               <a:spcAft>
                 <a:spcPts val="0"/>
               </a:spcAft>
@@ -8229,8 +8290,8 @@
               <a:buNone/>
             </a:pPr>
             <a:r>
-              <a:rPr lang="en-US" altLang="en-US" sz="1800" dirty="0"/>
-              <a:t>With this presentation we attempt to use data science as a method to understand why.</a:t>
+              <a:rPr lang="en-US" altLang="en-US" sz="1800" b="0" i="1" dirty="0"/>
+              <a:t>This presentation will attempt to use data science as a method to understand why.</a:t>
             </a:r>
           </a:p>
           <a:p>
@@ -8268,20 +8329,20 @@
     </p:spTree>
     <p:extLst>
       <p:ext uri="{BB962C8B-B14F-4D97-AF65-F5344CB8AC3E}">
-        <p14:creationId xmlns:p14="http://schemas.microsoft.com/office/powerpoint/2010/main" xmlns="" val="2493105783"/>
+        <p14:creationId xmlns:p14="http://schemas.microsoft.com/office/powerpoint/2010/main" val="2493105783"/>
       </p:ext>
     </p:extLst>
   </p:cSld>
   <p:clrMapOvr>
     <a:masterClrMapping/>
   </p:clrMapOvr>
-  <mc:AlternateContent xmlns:mc="http://schemas.openxmlformats.org/markup-compatibility/2006">
-    <mc:Choice xmlns:p14="http://schemas.microsoft.com/office/powerpoint/2010/main" xmlns="" Requires="p14">
+  <mc:AlternateContent xmlns:mc="http://schemas.openxmlformats.org/markup-compatibility/2006" xmlns:p14="http://schemas.microsoft.com/office/powerpoint/2010/main">
+    <mc:Choice Requires="p14">
       <p:transition spd="med" p14:dur="700">
         <p:fade/>
       </p:transition>
     </mc:Choice>
-    <mc:Fallback>
+    <mc:Fallback xmlns="">
       <p:transition spd="med">
         <p:fade/>
       </p:transition>
@@ -8339,7 +8400,7 @@
           <p:cNvPr id="6" name="Title 3">
             <a:extLst>
               <a:ext uri="{FF2B5EF4-FFF2-40B4-BE49-F238E27FC236}">
-                <a16:creationId xmlns:a16="http://schemas.microsoft.com/office/drawing/2014/main" xmlns="" id="{048FBE6B-DC67-4E64-80F4-CADE978D2FE3}"/>
+                <a16:creationId xmlns:a16="http://schemas.microsoft.com/office/drawing/2014/main" id="{048FBE6B-DC67-4E64-80F4-CADE978D2FE3}"/>
               </a:ext>
             </a:extLst>
           </p:cNvPr>
@@ -8828,13 +8889,13 @@
   <p:clrMapOvr>
     <a:masterClrMapping/>
   </p:clrMapOvr>
-  <mc:AlternateContent xmlns:mc="http://schemas.openxmlformats.org/markup-compatibility/2006">
-    <mc:Choice xmlns:p14="http://schemas.microsoft.com/office/powerpoint/2010/main" xmlns="" Requires="p14">
+  <mc:AlternateContent xmlns:mc="http://schemas.openxmlformats.org/markup-compatibility/2006" xmlns:p14="http://schemas.microsoft.com/office/powerpoint/2010/main">
+    <mc:Choice Requires="p14">
       <p:transition spd="med" p14:dur="700">
         <p:fade/>
       </p:transition>
     </mc:Choice>
-    <mc:Fallback>
+    <mc:Fallback xmlns="">
       <p:transition spd="med">
         <p:fade/>
       </p:transition>
@@ -8938,7 +8999,7 @@
           <p:cNvPr id="4" name="Title 3">
             <a:extLst>
               <a:ext uri="{FF2B5EF4-FFF2-40B4-BE49-F238E27FC236}">
-                <a16:creationId xmlns:a16="http://schemas.microsoft.com/office/drawing/2014/main" xmlns="" id="{048FBE6B-DC67-4E64-80F4-CADE978D2FE3}"/>
+                <a16:creationId xmlns:a16="http://schemas.microsoft.com/office/drawing/2014/main" id="{048FBE6B-DC67-4E64-80F4-CADE978D2FE3}"/>
               </a:ext>
             </a:extLst>
           </p:cNvPr>
@@ -9136,7 +9197,7 @@
                 <a:ea typeface="+mn-ea"/>
                 <a:cs typeface="+mn-cs"/>
               </a:rPr>
-              <a:t>48 locations in AZ and NM we confirmed </a:t>
+              <a:t>48 locations in AZ and NM average incident rate confirmed </a:t>
             </a:r>
           </a:p>
           <a:p>
@@ -9425,7 +9486,7 @@
                 <a:ea typeface="+mn-ea"/>
                 <a:cs typeface="+mn-cs"/>
               </a:rPr>
-              <a:t>The ANOVA told us the </a:t>
+              <a:t>The ANOVA shows that:</a:t>
             </a:r>
           </a:p>
           <a:p>
@@ -9495,7 +9556,7 @@
                 <a:ea typeface="+mn-ea"/>
                 <a:cs typeface="+mn-cs"/>
               </a:rPr>
-              <a:t>We can also see from the analysis and the graph that there is a significant</a:t>
+              <a:t>The analysis and graph provide significant</a:t>
             </a:r>
             <a:r>
               <a:rPr kumimoji="0" lang="en-US" sz="1600" b="0" i="0" u="none" strike="noStrike" kern="1200" cap="none" spc="0" normalizeH="0" noProof="0" dirty="0">
@@ -9742,7 +9803,7 @@
           <p:cNvPr id="6" name="Title 3">
             <a:extLst>
               <a:ext uri="{FF2B5EF4-FFF2-40B4-BE49-F238E27FC236}">
-                <a16:creationId xmlns:a16="http://schemas.microsoft.com/office/drawing/2014/main" xmlns="" id="{048FBE6B-DC67-4E64-80F4-CADE978D2FE3}"/>
+                <a16:creationId xmlns:a16="http://schemas.microsoft.com/office/drawing/2014/main" id="{048FBE6B-DC67-4E64-80F4-CADE978D2FE3}"/>
               </a:ext>
             </a:extLst>
           </p:cNvPr>
@@ -10271,13 +10332,13 @@
   <p:clrMapOvr>
     <a:masterClrMapping/>
   </p:clrMapOvr>
-  <mc:AlternateContent xmlns:mc="http://schemas.openxmlformats.org/markup-compatibility/2006">
-    <mc:Choice xmlns:p14="http://schemas.microsoft.com/office/powerpoint/2010/main" xmlns="" Requires="p14">
+  <mc:AlternateContent xmlns:mc="http://schemas.openxmlformats.org/markup-compatibility/2006" xmlns:p14="http://schemas.microsoft.com/office/powerpoint/2010/main">
+    <mc:Choice Requires="p14">
       <p:transition spd="med" p14:dur="700">
         <p:fade/>
       </p:transition>
     </mc:Choice>
-    <mc:Fallback>
+    <mc:Fallback xmlns="">
       <p:transition spd="med">
         <p:fade/>
       </p:transition>
@@ -10315,7 +10376,7 @@
         </p:nvSpPr>
         <p:spPr>
           <a:xfrm>
-            <a:off x="762000" y="1790699"/>
+            <a:off x="690979" y="1253638"/>
             <a:ext cx="10668000" cy="4350724"/>
           </a:xfrm>
         </p:spPr>
@@ -10398,7 +10459,7 @@
           <p:cNvPr id="5" name="Title 3">
             <a:extLst>
               <a:ext uri="{FF2B5EF4-FFF2-40B4-BE49-F238E27FC236}">
-                <a16:creationId xmlns:a16="http://schemas.microsoft.com/office/drawing/2014/main" xmlns="" id="{048FBE6B-DC67-4E64-80F4-CADE978D2FE3}"/>
+                <a16:creationId xmlns:a16="http://schemas.microsoft.com/office/drawing/2014/main" id="{048FBE6B-DC67-4E64-80F4-CADE978D2FE3}"/>
               </a:ext>
             </a:extLst>
           </p:cNvPr>
@@ -10409,7 +10470,12 @@
             <p:ph type="title"/>
           </p:nvPr>
         </p:nvSpPr>
-        <p:spPr/>
+        <p:spPr>
+          <a:xfrm>
+            <a:off x="762000" y="408800"/>
+            <a:ext cx="10668000" cy="615553"/>
+          </a:xfrm>
+        </p:spPr>
         <p:txBody>
           <a:bodyPr/>
           <a:lstStyle/>
@@ -10498,7 +10564,7 @@
           <p:cNvPr id="4" name="Title 3">
             <a:extLst>
               <a:ext uri="{FF2B5EF4-FFF2-40B4-BE49-F238E27FC236}">
-                <a16:creationId xmlns:a16="http://schemas.microsoft.com/office/drawing/2014/main" xmlns="" id="{048FBE6B-DC67-4E64-80F4-CADE978D2FE3}"/>
+                <a16:creationId xmlns:a16="http://schemas.microsoft.com/office/drawing/2014/main" id="{048FBE6B-DC67-4E64-80F4-CADE978D2FE3}"/>
               </a:ext>
             </a:extLst>
           </p:cNvPr>
@@ -10616,7 +10682,7 @@
           <p:cNvPr id="4" name="Title 3">
             <a:extLst>
               <a:ext uri="{FF2B5EF4-FFF2-40B4-BE49-F238E27FC236}">
-                <a16:creationId xmlns:a16="http://schemas.microsoft.com/office/drawing/2014/main" xmlns="" id="{048FBE6B-DC67-4E64-80F4-CADE978D2FE3}"/>
+                <a16:creationId xmlns:a16="http://schemas.microsoft.com/office/drawing/2014/main" id="{048FBE6B-DC67-4E64-80F4-CADE978D2FE3}"/>
               </a:ext>
             </a:extLst>
           </p:cNvPr>
@@ -10783,7 +10849,7 @@
           <p:cNvPr id="4" name="Title 3">
             <a:extLst>
               <a:ext uri="{FF2B5EF4-FFF2-40B4-BE49-F238E27FC236}">
-                <a16:creationId xmlns:a16="http://schemas.microsoft.com/office/drawing/2014/main" xmlns="" id="{048FBE6B-DC67-4E64-80F4-CADE978D2FE3}"/>
+                <a16:creationId xmlns:a16="http://schemas.microsoft.com/office/drawing/2014/main" id="{048FBE6B-DC67-4E64-80F4-CADE978D2FE3}"/>
               </a:ext>
             </a:extLst>
           </p:cNvPr>
@@ -10855,7 +10921,7 @@
           <p:cNvPr id="6" name="Title 5">
             <a:extLst>
               <a:ext uri="{FF2B5EF4-FFF2-40B4-BE49-F238E27FC236}">
-                <a16:creationId xmlns:a16="http://schemas.microsoft.com/office/drawing/2014/main" xmlns="" id="{C56504DE-4F83-437F-BDB6-306374C31C9C}"/>
+                <a16:creationId xmlns:a16="http://schemas.microsoft.com/office/drawing/2014/main" id="{C56504DE-4F83-437F-BDB6-306374C31C9C}"/>
               </a:ext>
             </a:extLst>
           </p:cNvPr>
@@ -10892,7 +10958,7 @@
           <p:cNvPr id="2" name="Text Placeholder 1">
             <a:extLst>
               <a:ext uri="{FF2B5EF4-FFF2-40B4-BE49-F238E27FC236}">
-                <a16:creationId xmlns:a16="http://schemas.microsoft.com/office/drawing/2014/main" xmlns="" id="{3F36812B-2065-4A2B-B59B-8957022687BC}"/>
+                <a16:creationId xmlns:a16="http://schemas.microsoft.com/office/drawing/2014/main" id="{3F36812B-2065-4A2B-B59B-8957022687BC}"/>
               </a:ext>
             </a:extLst>
           </p:cNvPr>
@@ -10991,20 +11057,20 @@
     </p:spTree>
     <p:extLst>
       <p:ext uri="{BB962C8B-B14F-4D97-AF65-F5344CB8AC3E}">
-        <p14:creationId xmlns:p14="http://schemas.microsoft.com/office/powerpoint/2010/main" xmlns="" val="3270876211"/>
+        <p14:creationId xmlns:p14="http://schemas.microsoft.com/office/powerpoint/2010/main" val="3270876211"/>
       </p:ext>
     </p:extLst>
   </p:cSld>
   <p:clrMapOvr>
     <a:masterClrMapping/>
   </p:clrMapOvr>
-  <mc:AlternateContent xmlns:mc="http://schemas.openxmlformats.org/markup-compatibility/2006">
-    <mc:Choice xmlns:p14="http://schemas.microsoft.com/office/powerpoint/2010/main" xmlns="" Requires="p14">
+  <mc:AlternateContent xmlns:mc="http://schemas.openxmlformats.org/markup-compatibility/2006" xmlns:p14="http://schemas.microsoft.com/office/powerpoint/2010/main">
+    <mc:Choice Requires="p14">
       <p:transition spd="med" p14:dur="700">
         <p:fade/>
       </p:transition>
     </mc:Choice>
-    <mc:Fallback>
+    <mc:Fallback xmlns="">
       <p:transition spd="med">
         <p:fade/>
       </p:transition>
@@ -11035,7 +11101,7 @@
           <p:cNvPr id="16" name="Text Placeholder 15">
             <a:extLst>
               <a:ext uri="{FF2B5EF4-FFF2-40B4-BE49-F238E27FC236}">
-                <a16:creationId xmlns:a16="http://schemas.microsoft.com/office/drawing/2014/main" xmlns="" id="{82B839A9-BE4F-40C7-ABA3-682B626FFB08}"/>
+                <a16:creationId xmlns:a16="http://schemas.microsoft.com/office/drawing/2014/main" id="{82B839A9-BE4F-40C7-ABA3-682B626FFB08}"/>
               </a:ext>
             </a:extLst>
           </p:cNvPr>
@@ -11069,7 +11135,7 @@
           <p:cNvPr id="5" name="Freeform: Shape 4">
             <a:extLst>
               <a:ext uri="{FF2B5EF4-FFF2-40B4-BE49-F238E27FC236}">
-                <a16:creationId xmlns:a16="http://schemas.microsoft.com/office/drawing/2014/main" xmlns="" id="{69764EBF-31FA-492E-8998-3077A3B6462E}"/>
+                <a16:creationId xmlns:a16="http://schemas.microsoft.com/office/drawing/2014/main" id="{69764EBF-31FA-492E-8998-3077A3B6462E}"/>
               </a:ext>
             </a:extLst>
           </p:cNvPr>
@@ -11217,7 +11283,7 @@
           <p:cNvPr id="8" name="Freeform: Shape 7">
             <a:extLst>
               <a:ext uri="{FF2B5EF4-FFF2-40B4-BE49-F238E27FC236}">
-                <a16:creationId xmlns:a16="http://schemas.microsoft.com/office/drawing/2014/main" xmlns="" id="{7D11453A-1865-4EAB-B7E0-024FA352854C}"/>
+                <a16:creationId xmlns:a16="http://schemas.microsoft.com/office/drawing/2014/main" id="{7D11453A-1865-4EAB-B7E0-024FA352854C}"/>
               </a:ext>
             </a:extLst>
           </p:cNvPr>
@@ -11376,7 +11442,7 @@
           <p:cNvPr id="10" name="Freeform: Shape 9">
             <a:extLst>
               <a:ext uri="{FF2B5EF4-FFF2-40B4-BE49-F238E27FC236}">
-                <a16:creationId xmlns:a16="http://schemas.microsoft.com/office/drawing/2014/main" xmlns="" id="{2C5EA7BE-5E78-4EA8-9C6D-F00C129B0C70}"/>
+                <a16:creationId xmlns:a16="http://schemas.microsoft.com/office/drawing/2014/main" id="{2C5EA7BE-5E78-4EA8-9C6D-F00C129B0C70}"/>
               </a:ext>
             </a:extLst>
           </p:cNvPr>
@@ -11524,7 +11590,7 @@
           <p:cNvPr id="14" name="Title 3">
             <a:extLst>
               <a:ext uri="{FF2B5EF4-FFF2-40B4-BE49-F238E27FC236}">
-                <a16:creationId xmlns:a16="http://schemas.microsoft.com/office/drawing/2014/main" xmlns="" id="{048FBE6B-DC67-4E64-80F4-CADE978D2FE3}"/>
+                <a16:creationId xmlns:a16="http://schemas.microsoft.com/office/drawing/2014/main" id="{048FBE6B-DC67-4E64-80F4-CADE978D2FE3}"/>
               </a:ext>
             </a:extLst>
           </p:cNvPr>
@@ -11687,20 +11753,20 @@
     </p:spTree>
     <p:extLst>
       <p:ext uri="{BB962C8B-B14F-4D97-AF65-F5344CB8AC3E}">
-        <p14:creationId xmlns:p14="http://schemas.microsoft.com/office/powerpoint/2010/main" xmlns="" val="4143959621"/>
+        <p14:creationId xmlns:p14="http://schemas.microsoft.com/office/powerpoint/2010/main" val="4143959621"/>
       </p:ext>
     </p:extLst>
   </p:cSld>
   <p:clrMapOvr>
     <a:masterClrMapping/>
   </p:clrMapOvr>
-  <mc:AlternateContent xmlns:mc="http://schemas.openxmlformats.org/markup-compatibility/2006">
-    <mc:Choice xmlns:p14="http://schemas.microsoft.com/office/powerpoint/2010/main" xmlns="" Requires="p14">
+  <mc:AlternateContent xmlns:mc="http://schemas.openxmlformats.org/markup-compatibility/2006" xmlns:p14="http://schemas.microsoft.com/office/powerpoint/2010/main">
+    <mc:Choice Requires="p14">
       <p:transition spd="med" p14:dur="700">
         <p:fade/>
       </p:transition>
     </mc:Choice>
-    <mc:Fallback>
+    <mc:Fallback xmlns="">
       <p:transition spd="med">
         <p:fade/>
       </p:transition>
@@ -11731,7 +11797,7 @@
           <p:cNvPr id="4" name="Title 3">
             <a:extLst>
               <a:ext uri="{FF2B5EF4-FFF2-40B4-BE49-F238E27FC236}">
-                <a16:creationId xmlns:a16="http://schemas.microsoft.com/office/drawing/2014/main" xmlns="" id="{FD9E38B3-4686-8247-9625-49018D29F408}"/>
+                <a16:creationId xmlns:a16="http://schemas.microsoft.com/office/drawing/2014/main" id="{FD9E38B3-4686-8247-9625-49018D29F408}"/>
               </a:ext>
             </a:extLst>
           </p:cNvPr>
@@ -11770,7 +11836,7 @@
           <p:cNvPr id="6" name="Text Placeholder 5">
             <a:extLst>
               <a:ext uri="{FF2B5EF4-FFF2-40B4-BE49-F238E27FC236}">
-                <a16:creationId xmlns:a16="http://schemas.microsoft.com/office/drawing/2014/main" xmlns="" id="{7DCBA01B-ECA4-4938-872A-B38BEB13AC06}"/>
+                <a16:creationId xmlns:a16="http://schemas.microsoft.com/office/drawing/2014/main" id="{7DCBA01B-ECA4-4938-872A-B38BEB13AC06}"/>
               </a:ext>
             </a:extLst>
           </p:cNvPr>
@@ -11803,7 +11869,7 @@
           <p:cNvPr id="5" name="Title 3">
             <a:extLst>
               <a:ext uri="{FF2B5EF4-FFF2-40B4-BE49-F238E27FC236}">
-                <a16:creationId xmlns:a16="http://schemas.microsoft.com/office/drawing/2014/main" xmlns="" id="{048FBE6B-DC67-4E64-80F4-CADE978D2FE3}"/>
+                <a16:creationId xmlns:a16="http://schemas.microsoft.com/office/drawing/2014/main" id="{048FBE6B-DC67-4E64-80F4-CADE978D2FE3}"/>
               </a:ext>
             </a:extLst>
           </p:cNvPr>
@@ -11882,20 +11948,20 @@
     </p:spTree>
     <p:extLst>
       <p:ext uri="{BB962C8B-B14F-4D97-AF65-F5344CB8AC3E}">
-        <p14:creationId xmlns:p14="http://schemas.microsoft.com/office/powerpoint/2010/main" xmlns="" val="1669862059"/>
+        <p14:creationId xmlns:p14="http://schemas.microsoft.com/office/powerpoint/2010/main" val="1669862059"/>
       </p:ext>
     </p:extLst>
   </p:cSld>
   <p:clrMapOvr>
     <a:masterClrMapping/>
   </p:clrMapOvr>
-  <mc:AlternateContent xmlns:mc="http://schemas.openxmlformats.org/markup-compatibility/2006">
-    <mc:Choice xmlns:p14="http://schemas.microsoft.com/office/powerpoint/2010/main" xmlns="" Requires="p14">
+  <mc:AlternateContent xmlns:mc="http://schemas.openxmlformats.org/markup-compatibility/2006" xmlns:p14="http://schemas.microsoft.com/office/powerpoint/2010/main">
+    <mc:Choice Requires="p14">
       <p:transition spd="med" p14:dur="700">
         <p:fade/>
       </p:transition>
     </mc:Choice>
-    <mc:Fallback>
+    <mc:Fallback xmlns="">
       <p:transition spd="med">
         <p:fade/>
       </p:transition>
@@ -11926,7 +11992,7 @@
           <p:cNvPr id="4" name="Title 3">
             <a:extLst>
               <a:ext uri="{FF2B5EF4-FFF2-40B4-BE49-F238E27FC236}">
-                <a16:creationId xmlns:a16="http://schemas.microsoft.com/office/drawing/2014/main" xmlns="" id="{FD9E38B3-4686-8247-9625-49018D29F408}"/>
+                <a16:creationId xmlns:a16="http://schemas.microsoft.com/office/drawing/2014/main" id="{FD9E38B3-4686-8247-9625-49018D29F408}"/>
               </a:ext>
             </a:extLst>
           </p:cNvPr>
@@ -11969,7 +12035,7 @@
           <p:cNvPr id="6" name="Text Placeholder 5">
             <a:extLst>
               <a:ext uri="{FF2B5EF4-FFF2-40B4-BE49-F238E27FC236}">
-                <a16:creationId xmlns:a16="http://schemas.microsoft.com/office/drawing/2014/main" xmlns="" id="{7DCBA01B-ECA4-4938-872A-B38BEB13AC06}"/>
+                <a16:creationId xmlns:a16="http://schemas.microsoft.com/office/drawing/2014/main" id="{7DCBA01B-ECA4-4938-872A-B38BEB13AC06}"/>
               </a:ext>
             </a:extLst>
           </p:cNvPr>
@@ -12075,28 +12141,8 @@
               <a:buChar char="•"/>
             </a:pPr>
             <a:r>
-              <a:rPr lang="en-US" sz="2000" dirty="0" smtClean="0"/>
-              <a:t> I </a:t>
-            </a:r>
-            <a:r>
               <a:rPr lang="en-US" sz="2000" dirty="0"/>
-              <a:t>love working with people and have </a:t>
-            </a:r>
-            <a:r>
-              <a:rPr lang="en-US" sz="2000" dirty="0" smtClean="0"/>
-              <a:t>a </a:t>
-            </a:r>
-            <a:r>
-              <a:rPr lang="en-US" sz="2000" dirty="0" smtClean="0"/>
-              <a:t>lifelong </a:t>
-            </a:r>
-            <a:r>
-              <a:rPr lang="en-US" sz="2000" dirty="0"/>
-              <a:t>love of all things </a:t>
-            </a:r>
-            <a:r>
-              <a:rPr lang="en-US" sz="2000" dirty="0" smtClean="0"/>
-              <a:t>technology. </a:t>
+              <a:t> I love working with people and have a lifelong love of all things technology. </a:t>
             </a:r>
           </a:p>
           <a:p>
@@ -12105,12 +12151,8 @@
               <a:buChar char="•"/>
             </a:pPr>
             <a:r>
-              <a:rPr lang="en-US" sz="2000" dirty="0" smtClean="0"/>
-              <a:t> I have </a:t>
-            </a:r>
-            <a:r>
               <a:rPr lang="en-US" sz="2000" dirty="0"/>
-              <a:t>always been a numbers guy. </a:t>
+              <a:t> I have always been a numbers guy. </a:t>
             </a:r>
           </a:p>
           <a:p>
@@ -12130,15 +12172,7 @@
             </a:pPr>
             <a:r>
               <a:rPr lang="en-US" sz="2000" dirty="0"/>
-              <a:t>I decided on Data Science because I literally could not find an industry in all the ones that I looked at being re-trained to work </a:t>
-            </a:r>
-            <a:r>
-              <a:rPr lang="en-US" sz="2000" dirty="0" smtClean="0"/>
-              <a:t>in, </a:t>
-            </a:r>
-            <a:r>
-              <a:rPr lang="en-US" sz="2000" dirty="0"/>
-              <a:t>that did not use DATA.  </a:t>
+              <a:t>I decided on Data Science because I literally could not find an industry in all the ones that I looked at being re-trained to work in, that did not use DATA.  </a:t>
             </a:r>
           </a:p>
           <a:p>
@@ -12166,7 +12200,7 @@
           <p:cNvPr id="5" name="Title 3">
             <a:extLst>
               <a:ext uri="{FF2B5EF4-FFF2-40B4-BE49-F238E27FC236}">
-                <a16:creationId xmlns:a16="http://schemas.microsoft.com/office/drawing/2014/main" xmlns="" id="{048FBE6B-DC67-4E64-80F4-CADE978D2FE3}"/>
+                <a16:creationId xmlns:a16="http://schemas.microsoft.com/office/drawing/2014/main" id="{048FBE6B-DC67-4E64-80F4-CADE978D2FE3}"/>
               </a:ext>
             </a:extLst>
           </p:cNvPr>
@@ -12245,20 +12279,20 @@
     </p:spTree>
     <p:extLst>
       <p:ext uri="{BB962C8B-B14F-4D97-AF65-F5344CB8AC3E}">
-        <p14:creationId xmlns:p14="http://schemas.microsoft.com/office/powerpoint/2010/main" xmlns="" val="803542810"/>
+        <p14:creationId xmlns:p14="http://schemas.microsoft.com/office/powerpoint/2010/main" val="803542810"/>
       </p:ext>
     </p:extLst>
   </p:cSld>
   <p:clrMapOvr>
     <a:masterClrMapping/>
   </p:clrMapOvr>
-  <mc:AlternateContent xmlns:mc="http://schemas.openxmlformats.org/markup-compatibility/2006">
-    <mc:Choice xmlns:p14="http://schemas.microsoft.com/office/powerpoint/2010/main" xmlns="" Requires="p14">
+  <mc:AlternateContent xmlns:mc="http://schemas.openxmlformats.org/markup-compatibility/2006" xmlns:p14="http://schemas.microsoft.com/office/powerpoint/2010/main">
+    <mc:Choice Requires="p14">
       <p:transition spd="med" p14:dur="700">
         <p:fade/>
       </p:transition>
     </mc:Choice>
-    <mc:Fallback>
+    <mc:Fallback xmlns="">
       <p:transition spd="med">
         <p:fade/>
       </p:transition>
@@ -12289,7 +12323,7 @@
           <p:cNvPr id="4" name="Title 3">
             <a:extLst>
               <a:ext uri="{FF2B5EF4-FFF2-40B4-BE49-F238E27FC236}">
-                <a16:creationId xmlns:a16="http://schemas.microsoft.com/office/drawing/2014/main" xmlns="" id="{FD9E38B3-4686-8247-9625-49018D29F408}"/>
+                <a16:creationId xmlns:a16="http://schemas.microsoft.com/office/drawing/2014/main" id="{FD9E38B3-4686-8247-9625-49018D29F408}"/>
               </a:ext>
             </a:extLst>
           </p:cNvPr>
@@ -12328,7 +12362,7 @@
           <p:cNvPr id="6" name="Text Placeholder 5">
             <a:extLst>
               <a:ext uri="{FF2B5EF4-FFF2-40B4-BE49-F238E27FC236}">
-                <a16:creationId xmlns:a16="http://schemas.microsoft.com/office/drawing/2014/main" xmlns="" id="{7DCBA01B-ECA4-4938-872A-B38BEB13AC06}"/>
+                <a16:creationId xmlns:a16="http://schemas.microsoft.com/office/drawing/2014/main" id="{7DCBA01B-ECA4-4938-872A-B38BEB13AC06}"/>
               </a:ext>
             </a:extLst>
           </p:cNvPr>
@@ -12393,7 +12427,7 @@
           <p:cNvPr id="5" name="Title 3">
             <a:extLst>
               <a:ext uri="{FF2B5EF4-FFF2-40B4-BE49-F238E27FC236}">
-                <a16:creationId xmlns:a16="http://schemas.microsoft.com/office/drawing/2014/main" xmlns="" id="{048FBE6B-DC67-4E64-80F4-CADE978D2FE3}"/>
+                <a16:creationId xmlns:a16="http://schemas.microsoft.com/office/drawing/2014/main" id="{048FBE6B-DC67-4E64-80F4-CADE978D2FE3}"/>
               </a:ext>
             </a:extLst>
           </p:cNvPr>
@@ -12472,20 +12506,20 @@
     </p:spTree>
     <p:extLst>
       <p:ext uri="{BB962C8B-B14F-4D97-AF65-F5344CB8AC3E}">
-        <p14:creationId xmlns:p14="http://schemas.microsoft.com/office/powerpoint/2010/main" xmlns="" val="3204684955"/>
+        <p14:creationId xmlns:p14="http://schemas.microsoft.com/office/powerpoint/2010/main" val="3204684955"/>
       </p:ext>
     </p:extLst>
   </p:cSld>
   <p:clrMapOvr>
     <a:masterClrMapping/>
   </p:clrMapOvr>
-  <mc:AlternateContent xmlns:mc="http://schemas.openxmlformats.org/markup-compatibility/2006">
-    <mc:Choice xmlns:p14="http://schemas.microsoft.com/office/powerpoint/2010/main" xmlns="" Requires="p14">
+  <mc:AlternateContent xmlns:mc="http://schemas.openxmlformats.org/markup-compatibility/2006" xmlns:p14="http://schemas.microsoft.com/office/powerpoint/2010/main">
+    <mc:Choice Requires="p14">
       <p:transition spd="med" p14:dur="700">
         <p:fade/>
       </p:transition>
     </mc:Choice>
-    <mc:Fallback>
+    <mc:Fallback xmlns="">
       <p:transition spd="med">
         <p:fade/>
       </p:transition>
@@ -12521,7 +12555,12 @@
             <p:ph type="body" sz="quarter" idx="13"/>
           </p:nvPr>
         </p:nvSpPr>
-        <p:spPr/>
+        <p:spPr>
+          <a:xfrm>
+            <a:off x="762000" y="1790699"/>
+            <a:ext cx="10668000" cy="685800"/>
+          </a:xfrm>
+        </p:spPr>
         <p:txBody>
           <a:bodyPr/>
           <a:lstStyle/>
@@ -12537,41 +12576,20 @@
             <a:endParaRPr lang="en-US" sz="2400" dirty="0"/>
           </a:p>
           <a:p>
+            <a:pPr marL="457200" indent="-457200">
+              <a:buFont typeface="Arial" panose="020B0604020202020204" pitchFamily="34" charset="0"/>
+              <a:buChar char="•"/>
+            </a:pPr>
+            <a:r>
+              <a:rPr lang="en-US" sz="2400" dirty="0"/>
+              <a:t>On the Navajo Nation about 30% of homes do not have running water </a:t>
+            </a:r>
+          </a:p>
+          <a:p>
             <a:pPr marL="457200" indent="-457200"/>
             <a:r>
               <a:rPr lang="en-US" sz="2400" dirty="0"/>
-              <a:t>On the Navajo Nation </a:t>
-            </a:r>
-            <a:r>
-              <a:rPr lang="en-US" sz="2400" dirty="0" smtClean="0"/>
-              <a:t>about 30</a:t>
-            </a:r>
-            <a:r>
-              <a:rPr lang="en-US" sz="2400" dirty="0"/>
-              <a:t>% of </a:t>
-            </a:r>
-            <a:r>
-              <a:rPr lang="en-US" sz="2400" dirty="0" smtClean="0"/>
-              <a:t>homes </a:t>
-            </a:r>
-            <a:r>
-              <a:rPr lang="en-US" sz="2400" dirty="0"/>
-              <a:t>do not have running water </a:t>
-            </a:r>
-          </a:p>
-          <a:p>
-            <a:pPr marL="457200" indent="-457200"/>
-            <a:r>
-              <a:rPr lang="en-US" sz="2400" dirty="0"/>
-              <a:t>Most Navajo have to </a:t>
-            </a:r>
-            <a:r>
-              <a:rPr lang="en-US" sz="2400" dirty="0" smtClean="0"/>
-              <a:t>“haul in” their own water </a:t>
-            </a:r>
-            <a:r>
-              <a:rPr lang="en-US" sz="2400" dirty="0"/>
-              <a:t>just to live. </a:t>
+              <a:t>Most Navajo must “haul in” their own water just to live. </a:t>
             </a:r>
           </a:p>
           <a:p>
@@ -12579,10 +12597,13 @@
             <a:endParaRPr lang="en-US" sz="2400" dirty="0"/>
           </a:p>
           <a:p>
-            <a:pPr marL="457200" indent="-457200"/>
+            <a:pPr marL="457200" indent="-457200">
+              <a:buFont typeface="Arial" panose="020B0604020202020204" pitchFamily="34" charset="0"/>
+              <a:buChar char="•"/>
+            </a:pPr>
             <a:r>
               <a:rPr lang="en-US" sz="2400" dirty="0"/>
-              <a:t>The Navajo Nation is sprawling. It’s roughly the size of West Virginia and for some people that means driving as much as two hours to get water. </a:t>
+              <a:t>The Navajo Nation is sprawling. It’s roughly the size of West Virginia and for some that means driving as much as two hours to get water or food.</a:t>
             </a:r>
           </a:p>
         </p:txBody>
@@ -12592,7 +12613,7 @@
           <p:cNvPr id="4" name="Title 3">
             <a:extLst>
               <a:ext uri="{FF2B5EF4-FFF2-40B4-BE49-F238E27FC236}">
-                <a16:creationId xmlns:a16="http://schemas.microsoft.com/office/drawing/2014/main" xmlns="" id="{048FBE6B-DC67-4E64-80F4-CADE978D2FE3}"/>
+                <a16:creationId xmlns:a16="http://schemas.microsoft.com/office/drawing/2014/main" id="{048FBE6B-DC67-4E64-80F4-CADE978D2FE3}"/>
               </a:ext>
             </a:extLst>
           </p:cNvPr>
@@ -12668,45 +12689,16 @@
           <a:p>
             <a:r>
               <a:rPr lang="en-US" dirty="0"/>
-              <a:t>Navajo Believe the land to be </a:t>
-            </a:r>
-            <a:r>
-              <a:rPr lang="en-US" dirty="0" smtClean="0"/>
-              <a:t>sacred land</a:t>
-            </a:r>
+              <a:t>Navajo Believe the land to be sacred land, most of the culture is based around stories that they share among the Navajo People.  </a:t>
+            </a:r>
+          </a:p>
+          <a:p>
+            <a:endParaRPr lang="en-US" dirty="0"/>
+          </a:p>
+          <a:p>
             <a:r>
               <a:rPr lang="en-US" dirty="0"/>
-              <a:t>, most of the culture is </a:t>
-            </a:r>
-            <a:r>
-              <a:rPr lang="en-US" dirty="0" smtClean="0"/>
-              <a:t>based around </a:t>
-            </a:r>
-            <a:r>
-              <a:rPr lang="en-US" dirty="0"/>
-              <a:t>stories that they share among </a:t>
-            </a:r>
-            <a:r>
-              <a:rPr lang="en-US" dirty="0" smtClean="0"/>
-              <a:t>the Navajo People.  </a:t>
-            </a:r>
-            <a:endParaRPr lang="en-US" dirty="0"/>
-          </a:p>
-          <a:p>
-            <a:endParaRPr lang="en-US" dirty="0"/>
-          </a:p>
-          <a:p>
-            <a:r>
-              <a:rPr lang="en-US" dirty="0"/>
-              <a:t>They called the Covid a monster, they used the story of creation story </a:t>
-            </a:r>
-            <a:r>
-              <a:rPr lang="en-US" dirty="0" smtClean="0"/>
-              <a:t>to tell </a:t>
-            </a:r>
-            <a:r>
-              <a:rPr lang="en-US" dirty="0"/>
-              <a:t>this story </a:t>
+              <a:t>They called the Covid a monster, they used the story of creation story to tell this story </a:t>
             </a:r>
           </a:p>
           <a:p>
@@ -12743,34 +12735,28 @@
               <a:rPr lang="en-US" b="1" dirty="0">
                 <a:hlinkClick r:id="rId2"/>
               </a:rPr>
-              <a:t>https://</a:t>
-            </a:r>
-            <a:r>
-              <a:rPr lang="en-US" b="1" dirty="0" smtClean="0">
-                <a:hlinkClick r:id="rId2"/>
-              </a:rPr>
-              <a:t>www.navajocovid19.com</a:t>
-            </a:r>
-            <a:endParaRPr lang="en-US" b="1" dirty="0" smtClean="0"/>
+              <a:t>https://www.navajocovid19.com</a:t>
+            </a:r>
+            <a:endParaRPr lang="en-US" b="1" dirty="0"/>
           </a:p>
           <a:p>
             <a:pPr algn="r"/>
-            <a:endParaRPr lang="en-US" b="1" dirty="0" smtClean="0"/>
+            <a:endParaRPr lang="en-US" b="1" dirty="0"/>
           </a:p>
           <a:p>
             <a:pPr algn="r"/>
-            <a:endParaRPr lang="en-US" b="1" dirty="0" smtClean="0"/>
+            <a:endParaRPr lang="en-US" b="1" dirty="0"/>
           </a:p>
           <a:p>
             <a:pPr algn="r"/>
-            <a:endParaRPr lang="en-US" b="1" dirty="0" smtClean="0"/>
+            <a:endParaRPr lang="en-US" b="1" dirty="0"/>
           </a:p>
           <a:p>
             <a:pPr algn="r"/>
             <a:endParaRPr lang="en-US" sz="1400" b="1" dirty="0"/>
           </a:p>
           <a:p>
-            <a:endParaRPr lang="en-US" dirty="0" smtClean="0"/>
+            <a:endParaRPr lang="en-US" dirty="0"/>
           </a:p>
           <a:p>
             <a:endParaRPr lang="en-US" dirty="0"/>
@@ -12785,7 +12771,7 @@
           <p:cNvPr id="4" name="Title 3">
             <a:extLst>
               <a:ext uri="{FF2B5EF4-FFF2-40B4-BE49-F238E27FC236}">
-                <a16:creationId xmlns:a16="http://schemas.microsoft.com/office/drawing/2014/main" xmlns="" id="{048FBE6B-DC67-4E64-80F4-CADE978D2FE3}"/>
+                <a16:creationId xmlns:a16="http://schemas.microsoft.com/office/drawing/2014/main" id="{048FBE6B-DC67-4E64-80F4-CADE978D2FE3}"/>
               </a:ext>
             </a:extLst>
           </p:cNvPr>
@@ -12943,15 +12929,7 @@
             </a:pPr>
             <a:r>
               <a:rPr lang="en-US" sz="2400" dirty="0"/>
-              <a:t> The Navajo Nation is famous for many things, most </a:t>
-            </a:r>
-            <a:r>
-              <a:rPr lang="en-US" sz="2400" dirty="0" smtClean="0"/>
-              <a:t>notably was </a:t>
-            </a:r>
-            <a:r>
-              <a:rPr lang="en-US" sz="2400" dirty="0"/>
-              <a:t>the Navajo Code Talkers, who took part in every assault the U.S. Marines conducted in the Pacific from 1942 to 1945 during WWII, they were instrumental in defeating the Japanese.  </a:t>
+              <a:t> The Navajo Nation is famous for many things, most notably was the Navajo Code Talkers, who took part in every assault the U.S. Marines conducted in the Pacific from 1942 to 1945 during WWII, they were instrumental in defeating the Japanese.  </a:t>
             </a:r>
           </a:p>
           <a:p>
@@ -12987,7 +12965,7 @@
           <p:cNvPr id="4" name="Title 3">
             <a:extLst>
               <a:ext uri="{FF2B5EF4-FFF2-40B4-BE49-F238E27FC236}">
-                <a16:creationId xmlns:a16="http://schemas.microsoft.com/office/drawing/2014/main" xmlns="" id="{048FBE6B-DC67-4E64-80F4-CADE978D2FE3}"/>
+                <a16:creationId xmlns:a16="http://schemas.microsoft.com/office/drawing/2014/main" id="{048FBE6B-DC67-4E64-80F4-CADE978D2FE3}"/>
               </a:ext>
             </a:extLst>
           </p:cNvPr>
@@ -13224,7 +13202,7 @@
   <a:extraClrSchemeLst/>
   <a:extLst>
     <a:ext uri="{05A4C25C-085E-4340-85A3-A5531E510DB2}">
-      <thm15:themeFamily xmlns:thm15="http://schemas.microsoft.com/office/thememl/2012/main" xmlns="" name="Native American Heritage_TM10238373_WAC_LW_v4" id="{CD8DBC1F-6103-47D5-9C71-DE12184EFD6C}" vid="{2507BD49-7026-4E8F-85EA-549F820D09DD}"/>
+      <thm15:themeFamily xmlns:thm15="http://schemas.microsoft.com/office/thememl/2012/main" name="Native American Heritage_TM10238373_WAC_LW_v4" id="{CD8DBC1F-6103-47D5-9C71-DE12184EFD6C}" vid="{2507BD49-7026-4E8F-85EA-549F820D09DD}"/>
     </a:ext>
   </a:extLst>
 </a:theme>
@@ -13514,21 +13492,21 @@
 </file>
 
 <file path=customXml/item1.xml><?xml version="1.0" encoding="utf-8"?>
+<p:properties xmlns:p="http://schemas.microsoft.com/office/2006/metadata/properties" xmlns:xsi="http://www.w3.org/2001/XMLSchema-instance" xmlns:pc="http://schemas.microsoft.com/office/infopath/2007/PartnerControls">
+  <documentManagement>
+    <Status xmlns="71af3243-3dd4-4a8d-8c0d-dd76da1f02a5">Not started</Status>
+    <MediaServiceKeyPoints xmlns="71af3243-3dd4-4a8d-8c0d-dd76da1f02a5" xsi:nil="true"/>
+  </documentManagement>
+</p:properties>
+</file>
+
+<file path=customXml/item2.xml><?xml version="1.0" encoding="utf-8"?>
 <?mso-contentType ?>
 <FormTemplates xmlns="http://schemas.microsoft.com/sharepoint/v3/contenttype/forms">
   <Display>DocumentLibraryForm</Display>
   <Edit>DocumentLibraryForm</Edit>
   <New>DocumentLibraryForm</New>
 </FormTemplates>
-</file>
-
-<file path=customXml/item2.xml><?xml version="1.0" encoding="utf-8"?>
-<p:properties xmlns:p="http://schemas.microsoft.com/office/2006/metadata/properties" xmlns:xsi="http://www.w3.org/2001/XMLSchema-instance" xmlns:pc="http://schemas.microsoft.com/office/infopath/2007/PartnerControls">
-  <documentManagement>
-    <Status xmlns="71af3243-3dd4-4a8d-8c0d-dd76da1f02a5">Not started</Status>
-    <MediaServiceKeyPoints xmlns="71af3243-3dd4-4a8d-8c0d-dd76da1f02a5" xsi:nil="true"/>
-  </documentManagement>
-</p:properties>
 </file>
 
 <file path=customXml/item3.xml><?xml version="1.0" encoding="utf-8"?>
@@ -13753,19 +13731,19 @@
 </file>
 
 <file path=customXml/itemProps1.xml><?xml version="1.0" encoding="utf-8"?>
-<ds:datastoreItem xmlns:ds="http://schemas.openxmlformats.org/officeDocument/2006/customXml" ds:itemID="{FF48AAC1-C4CE-4FF3-AA8D-E74D22748061}">
+<ds:datastoreItem xmlns:ds="http://schemas.openxmlformats.org/officeDocument/2006/customXml" ds:itemID="{F87694BC-F79F-405B-BC53-DDA5DE16E747}">
   <ds:schemaRefs>
-    <ds:schemaRef ds:uri="http://schemas.microsoft.com/sharepoint/v3/contenttype/forms"/>
+    <ds:schemaRef ds:uri="http://schemas.microsoft.com/office/2006/metadata/properties"/>
+    <ds:schemaRef ds:uri="http://schemas.microsoft.com/office/infopath/2007/PartnerControls"/>
+    <ds:schemaRef ds:uri="71af3243-3dd4-4a8d-8c0d-dd76da1f02a5"/>
   </ds:schemaRefs>
 </ds:datastoreItem>
 </file>
 
 <file path=customXml/itemProps2.xml><?xml version="1.0" encoding="utf-8"?>
-<ds:datastoreItem xmlns:ds="http://schemas.openxmlformats.org/officeDocument/2006/customXml" ds:itemID="{F87694BC-F79F-405B-BC53-DDA5DE16E747}">
+<ds:datastoreItem xmlns:ds="http://schemas.openxmlformats.org/officeDocument/2006/customXml" ds:itemID="{FF48AAC1-C4CE-4FF3-AA8D-E74D22748061}">
   <ds:schemaRefs>
-    <ds:schemaRef ds:uri="http://schemas.microsoft.com/office/2006/metadata/properties"/>
-    <ds:schemaRef ds:uri="http://schemas.microsoft.com/office/infopath/2007/PartnerControls"/>
-    <ds:schemaRef ds:uri="71af3243-3dd4-4a8d-8c0d-dd76da1f02a5"/>
+    <ds:schemaRef ds:uri="http://schemas.microsoft.com/sharepoint/v3/contenttype/forms"/>
   </ds:schemaRefs>
 </ds:datastoreItem>
 </file>

</xml_diff>